<commit_message>
Changes to presentation slides on organization dysfunction
</commit_message>
<xml_diff>
--- a/FinalPaper/Townes_POLS6320_2020_Spring_FinalPaper_Presentation_v00.pptx
+++ b/FinalPaper/Townes_POLS6320_2020_Spring_FinalPaper_Presentation_v00.pptx
@@ -9,8 +9,8 @@
     <p:sldId id="257" r:id="rId3"/>
     <p:sldId id="259" r:id="rId4"/>
     <p:sldId id="258" r:id="rId5"/>
-    <p:sldId id="264" r:id="rId6"/>
-    <p:sldId id="265" r:id="rId7"/>
+    <p:sldId id="266" r:id="rId6"/>
+    <p:sldId id="267" r:id="rId7"/>
     <p:sldId id="260" r:id="rId8"/>
     <p:sldId id="262" r:id="rId9"/>
     <p:sldId id="263" r:id="rId10"/>
@@ -249,7 +249,7 @@
           <a:p>
             <a:fld id="{721C96B5-8CD6-42CD-A2F3-B97FDED654A7}" type="datetimeFigureOut">
               <a:rPr lang="en-US" smtClean="0"/>
-              <a:t>4/30/2020</a:t>
+              <a:t>5/1/2020</a:t>
             </a:fld>
             <a:endParaRPr lang="en-US"/>
           </a:p>
@@ -417,7 +417,7 @@
           <a:p>
             <a:fld id="{721C96B5-8CD6-42CD-A2F3-B97FDED654A7}" type="datetimeFigureOut">
               <a:rPr lang="en-US" smtClean="0"/>
-              <a:t>4/30/2020</a:t>
+              <a:t>5/1/2020</a:t>
             </a:fld>
             <a:endParaRPr lang="en-US"/>
           </a:p>
@@ -595,7 +595,7 @@
           <a:p>
             <a:fld id="{721C96B5-8CD6-42CD-A2F3-B97FDED654A7}" type="datetimeFigureOut">
               <a:rPr lang="en-US" smtClean="0"/>
-              <a:t>4/30/2020</a:t>
+              <a:t>5/1/2020</a:t>
             </a:fld>
             <a:endParaRPr lang="en-US"/>
           </a:p>
@@ -763,7 +763,7 @@
           <a:p>
             <a:fld id="{721C96B5-8CD6-42CD-A2F3-B97FDED654A7}" type="datetimeFigureOut">
               <a:rPr lang="en-US" smtClean="0"/>
-              <a:t>4/30/2020</a:t>
+              <a:t>5/1/2020</a:t>
             </a:fld>
             <a:endParaRPr lang="en-US"/>
           </a:p>
@@ -1008,7 +1008,7 @@
           <a:p>
             <a:fld id="{721C96B5-8CD6-42CD-A2F3-B97FDED654A7}" type="datetimeFigureOut">
               <a:rPr lang="en-US" smtClean="0"/>
-              <a:t>4/30/2020</a:t>
+              <a:t>5/1/2020</a:t>
             </a:fld>
             <a:endParaRPr lang="en-US"/>
           </a:p>
@@ -1237,7 +1237,7 @@
           <a:p>
             <a:fld id="{721C96B5-8CD6-42CD-A2F3-B97FDED654A7}" type="datetimeFigureOut">
               <a:rPr lang="en-US" smtClean="0"/>
-              <a:t>4/30/2020</a:t>
+              <a:t>5/1/2020</a:t>
             </a:fld>
             <a:endParaRPr lang="en-US"/>
           </a:p>
@@ -1601,7 +1601,7 @@
           <a:p>
             <a:fld id="{721C96B5-8CD6-42CD-A2F3-B97FDED654A7}" type="datetimeFigureOut">
               <a:rPr lang="en-US" smtClean="0"/>
-              <a:t>4/30/2020</a:t>
+              <a:t>5/1/2020</a:t>
             </a:fld>
             <a:endParaRPr lang="en-US"/>
           </a:p>
@@ -1718,7 +1718,7 @@
           <a:p>
             <a:fld id="{721C96B5-8CD6-42CD-A2F3-B97FDED654A7}" type="datetimeFigureOut">
               <a:rPr lang="en-US" smtClean="0"/>
-              <a:t>4/30/2020</a:t>
+              <a:t>5/1/2020</a:t>
             </a:fld>
             <a:endParaRPr lang="en-US"/>
           </a:p>
@@ -1813,7 +1813,7 @@
           <a:p>
             <a:fld id="{721C96B5-8CD6-42CD-A2F3-B97FDED654A7}" type="datetimeFigureOut">
               <a:rPr lang="en-US" smtClean="0"/>
-              <a:t>4/30/2020</a:t>
+              <a:t>5/1/2020</a:t>
             </a:fld>
             <a:endParaRPr lang="en-US"/>
           </a:p>
@@ -2088,7 +2088,7 @@
           <a:p>
             <a:fld id="{721C96B5-8CD6-42CD-A2F3-B97FDED654A7}" type="datetimeFigureOut">
               <a:rPr lang="en-US" smtClean="0"/>
-              <a:t>4/30/2020</a:t>
+              <a:t>5/1/2020</a:t>
             </a:fld>
             <a:endParaRPr lang="en-US"/>
           </a:p>
@@ -2340,7 +2340,7 @@
           <a:p>
             <a:fld id="{721C96B5-8CD6-42CD-A2F3-B97FDED654A7}" type="datetimeFigureOut">
               <a:rPr lang="en-US" smtClean="0"/>
-              <a:t>4/30/2020</a:t>
+              <a:t>5/1/2020</a:t>
             </a:fld>
             <a:endParaRPr lang="en-US"/>
           </a:p>
@@ -2551,7 +2551,7 @@
           <a:p>
             <a:fld id="{721C96B5-8CD6-42CD-A2F3-B97FDED654A7}" type="datetimeFigureOut">
               <a:rPr lang="en-US" smtClean="0"/>
-              <a:t>4/30/2020</a:t>
+              <a:t>5/1/2020</a:t>
             </a:fld>
             <a:endParaRPr lang="en-US"/>
           </a:p>
@@ -3085,14 +3085,14 @@
           <p:nvPr>
             <p:extLst>
               <p:ext uri="{D42A27DB-BD31-4B8C-83A1-F6EECF244321}">
-                <p14:modId xmlns:p14="http://schemas.microsoft.com/office/powerpoint/2010/main" val="3566390037"/>
+                <p14:modId xmlns:p14="http://schemas.microsoft.com/office/powerpoint/2010/main" val="3710256244"/>
               </p:ext>
             </p:extLst>
           </p:nvPr>
         </p:nvGraphicFramePr>
         <p:xfrm>
           <a:off x="152400" y="228600"/>
-          <a:ext cx="11887200" cy="6675120"/>
+          <a:ext cx="11887200" cy="6400800"/>
         </p:xfrm>
         <a:graphic>
           <a:graphicData uri="http://schemas.openxmlformats.org/drawingml/2006/table">
@@ -3194,12 +3194,15 @@
                     <a:lstStyle/>
                     <a:p>
                       <a:r>
-                        <a:rPr lang="en-US" dirty="0"/>
-                        <a:t>The analogy of an organization being like an organism</a:t>
+                        <a:rPr lang="en-US" baseline="0" dirty="0"/>
+                        <a:t>Conceived of organizations as </a:t>
                       </a:r>
+                      <a:br>
+                        <a:rPr lang="en-US" baseline="0" dirty="0"/>
+                      </a:br>
                       <a:r>
                         <a:rPr lang="en-US" baseline="0" dirty="0"/>
-                        <a:t> had given way to the notion that an organization is an organism that has independent motivations.</a:t>
+                        <a:t>human-like entities capable of independent motivations and action.</a:t>
                       </a:r>
                       <a:endParaRPr lang="en-US" dirty="0"/>
                     </a:p>
@@ -3311,7 +3314,7 @@
                       </a:r>
                       <a:r>
                         <a:rPr lang="en-US" baseline="0" dirty="0"/>
-                        <a:t> change occurs</a:t>
+                        <a:t> organizational change occurs</a:t>
                       </a:r>
                       <a:endParaRPr lang="en-US" dirty="0"/>
                     </a:p>
@@ -3412,7 +3415,7 @@
                       </a:r>
                       <a:r>
                         <a:rPr lang="en-US" baseline="0" dirty="0"/>
-                        <a:t>, appropriate, and useful method to effectuate change in an organization.</a:t>
+                        <a:t>, appropriate, and useful method to effectuate beneficial change in an organization.</a:t>
                       </a:r>
                       <a:endParaRPr lang="en-US" dirty="0"/>
                     </a:p>
@@ -3844,263 +3847,372 @@
           <a:chExt cx="0" cy="0"/>
         </a:xfrm>
       </p:grpSpPr>
-      <p:sp>
-        <p:nvSpPr>
-          <p:cNvPr id="3" name="Callout: Down Arrow 2"/>
+      <p:grpSp>
+        <p:nvGrpSpPr>
+          <p:cNvPr id="6" name="Group 5"/>
+          <p:cNvGrpSpPr>
+            <a:grpSpLocks noChangeAspect="1"/>
+          </p:cNvGrpSpPr>
+          <p:nvPr/>
+        </p:nvGrpSpPr>
+        <p:grpSpPr>
+          <a:xfrm>
+            <a:off x="734407" y="2075504"/>
+            <a:ext cx="3049215" cy="1828800"/>
+            <a:chOff x="6029740" y="3314038"/>
+            <a:chExt cx="2769703" cy="1661160"/>
+          </a:xfrm>
+        </p:grpSpPr>
+        <p:pic>
+          <p:nvPicPr>
+            <p:cNvPr id="2" name="Picture 1"/>
+            <p:cNvPicPr>
+              <a:picLocks noChangeAspect="1"/>
+            </p:cNvPicPr>
+            <p:nvPr/>
+          </p:nvPicPr>
+          <p:blipFill rotWithShape="1">
+            <a:blip r:embed="rId2">
+              <a:extLst>
+                <a:ext uri="{28A0092B-C50C-407E-A947-70E740481C1C}">
+                  <a14:useLocalDpi xmlns:a14="http://schemas.microsoft.com/office/drawing/2010/main" val="0"/>
+                </a:ext>
+              </a:extLst>
+            </a:blip>
+            <a:srcRect r="73671"/>
+            <a:stretch/>
+          </p:blipFill>
+          <p:spPr>
+            <a:xfrm>
+              <a:off x="8077200" y="3314038"/>
+              <a:ext cx="722243" cy="1661160"/>
+            </a:xfrm>
+            <a:prstGeom prst="rect">
+              <a:avLst/>
+            </a:prstGeom>
+          </p:spPr>
+        </p:pic>
+        <p:pic>
+          <p:nvPicPr>
+            <p:cNvPr id="3" name="Picture 2"/>
+            <p:cNvPicPr>
+              <a:picLocks noChangeAspect="1"/>
+            </p:cNvPicPr>
+            <p:nvPr/>
+          </p:nvPicPr>
+          <p:blipFill rotWithShape="1">
+            <a:blip r:embed="rId2">
+              <a:extLst>
+                <a:ext uri="{28A0092B-C50C-407E-A947-70E740481C1C}">
+                  <a14:useLocalDpi xmlns:a14="http://schemas.microsoft.com/office/drawing/2010/main" val="0"/>
+                </a:ext>
+              </a:extLst>
+            </a:blip>
+            <a:srcRect l="25363" r="50483"/>
+            <a:stretch/>
+          </p:blipFill>
+          <p:spPr>
+            <a:xfrm>
+              <a:off x="7414591" y="3314038"/>
+              <a:ext cx="662609" cy="1661160"/>
+            </a:xfrm>
+            <a:prstGeom prst="rect">
+              <a:avLst/>
+            </a:prstGeom>
+          </p:spPr>
+        </p:pic>
+        <p:pic>
+          <p:nvPicPr>
+            <p:cNvPr id="4" name="Picture 3"/>
+            <p:cNvPicPr>
+              <a:picLocks noChangeAspect="1"/>
+            </p:cNvPicPr>
+            <p:nvPr/>
+          </p:nvPicPr>
+          <p:blipFill rotWithShape="1">
+            <a:blip r:embed="rId2">
+              <a:extLst>
+                <a:ext uri="{28A0092B-C50C-407E-A947-70E740481C1C}">
+                  <a14:useLocalDpi xmlns:a14="http://schemas.microsoft.com/office/drawing/2010/main" val="0"/>
+                </a:ext>
+              </a:extLst>
+            </a:blip>
+            <a:srcRect l="50000" r="26812"/>
+            <a:stretch/>
+          </p:blipFill>
+          <p:spPr>
+            <a:xfrm>
+              <a:off x="6765235" y="3314038"/>
+              <a:ext cx="636104" cy="1661160"/>
+            </a:xfrm>
+            <a:prstGeom prst="rect">
+              <a:avLst/>
+            </a:prstGeom>
+          </p:spPr>
+        </p:pic>
+        <p:pic>
+          <p:nvPicPr>
+            <p:cNvPr id="5" name="Picture 4"/>
+            <p:cNvPicPr>
+              <a:picLocks noChangeAspect="1"/>
+            </p:cNvPicPr>
+            <p:nvPr/>
+          </p:nvPicPr>
+          <p:blipFill rotWithShape="1">
+            <a:blip r:embed="rId2">
+              <a:extLst>
+                <a:ext uri="{28A0092B-C50C-407E-A947-70E740481C1C}">
+                  <a14:useLocalDpi xmlns:a14="http://schemas.microsoft.com/office/drawing/2010/main" val="0"/>
+                </a:ext>
+              </a:extLst>
+            </a:blip>
+            <a:srcRect l="73189"/>
+            <a:stretch/>
+          </p:blipFill>
+          <p:spPr>
+            <a:xfrm>
+              <a:off x="6029740" y="3314038"/>
+              <a:ext cx="735495" cy="1661160"/>
+            </a:xfrm>
+            <a:prstGeom prst="rect">
+              <a:avLst/>
+            </a:prstGeom>
+          </p:spPr>
+        </p:pic>
+      </p:grpSp>
+      <p:pic>
+        <p:nvPicPr>
+          <p:cNvPr id="8" name="Picture 7"/>
+          <p:cNvPicPr>
+            <a:picLocks noChangeAspect="1"/>
+          </p:cNvPicPr>
+          <p:nvPr/>
+        </p:nvPicPr>
+        <p:blipFill>
+          <a:blip r:embed="rId3"/>
+          <a:stretch>
+            <a:fillRect/>
+          </a:stretch>
+        </p:blipFill>
+        <p:spPr>
+          <a:xfrm>
+            <a:off x="4362660" y="1846904"/>
+            <a:ext cx="3466680" cy="2286000"/>
+          </a:xfrm>
+          <a:prstGeom prst="rect">
+            <a:avLst/>
+          </a:prstGeom>
+          <a:ln>
+            <a:noFill/>
+          </a:ln>
+          <a:effectLst>
+            <a:softEdge rad="112500"/>
+          </a:effectLst>
+        </p:spPr>
+      </p:pic>
+      <p:pic>
+        <p:nvPicPr>
+          <p:cNvPr id="9" name="Picture 8"/>
+          <p:cNvPicPr>
+            <a:picLocks noChangeAspect="1"/>
+          </p:cNvPicPr>
+          <p:nvPr/>
+        </p:nvPicPr>
+        <p:blipFill>
+          <a:blip r:embed="rId4">
+            <a:extLst>
+              <a:ext uri="{28A0092B-C50C-407E-A947-70E740481C1C}">
+                <a14:useLocalDpi xmlns:a14="http://schemas.microsoft.com/office/drawing/2010/main" val="0"/>
+              </a:ext>
+            </a:extLst>
+          </a:blip>
+          <a:stretch>
+            <a:fillRect/>
+          </a:stretch>
+        </p:blipFill>
+        <p:spPr>
+          <a:xfrm>
+            <a:off x="8121334" y="1846904"/>
+            <a:ext cx="2870444" cy="2286000"/>
+          </a:xfrm>
+          <a:prstGeom prst="rect">
+            <a:avLst/>
+          </a:prstGeom>
+          <a:ln>
+            <a:noFill/>
+          </a:ln>
+          <a:effectLst>
+            <a:softEdge rad="112500"/>
+          </a:effectLst>
+        </p:spPr>
+      </p:pic>
+      <p:sp>
+        <p:nvSpPr>
+          <p:cNvPr id="10" name="TextBox 9"/>
+          <p:cNvSpPr txBox="1"/>
+          <p:nvPr/>
+        </p:nvSpPr>
+        <p:spPr>
+          <a:xfrm>
+            <a:off x="887414" y="914400"/>
+            <a:ext cx="2743200" cy="461665"/>
+          </a:xfrm>
+          <a:prstGeom prst="rect">
+            <a:avLst/>
+          </a:prstGeom>
+          <a:noFill/>
+        </p:spPr>
+        <p:txBody>
+          <a:bodyPr wrap="square" rtlCol="0">
+            <a:spAutoFit/>
+          </a:bodyPr>
+          <a:lstStyle/>
+          <a:p>
+            <a:pPr algn="ctr"/>
+            <a:r>
+              <a:rPr lang="en-US" sz="2400" b="1" dirty="0"/>
+              <a:t>Dehumanization</a:t>
+            </a:r>
+          </a:p>
+        </p:txBody>
+      </p:sp>
+      <p:sp>
+        <p:nvSpPr>
+          <p:cNvPr id="11" name="TextBox 10"/>
+          <p:cNvSpPr txBox="1"/>
+          <p:nvPr/>
+        </p:nvSpPr>
+        <p:spPr>
+          <a:xfrm>
+            <a:off x="4724400" y="914400"/>
+            <a:ext cx="2743200" cy="461665"/>
+          </a:xfrm>
+          <a:prstGeom prst="rect">
+            <a:avLst/>
+          </a:prstGeom>
+          <a:noFill/>
+        </p:spPr>
+        <p:txBody>
+          <a:bodyPr wrap="square" rtlCol="0">
+            <a:spAutoFit/>
+          </a:bodyPr>
+          <a:lstStyle/>
+          <a:p>
+            <a:pPr algn="ctr"/>
+            <a:r>
+              <a:rPr lang="en-US" sz="2400" b="1" dirty="0"/>
+              <a:t>Whistleblowing</a:t>
+            </a:r>
+          </a:p>
+        </p:txBody>
+      </p:sp>
+      <p:sp>
+        <p:nvSpPr>
+          <p:cNvPr id="12" name="TextBox 11"/>
+          <p:cNvSpPr txBox="1"/>
+          <p:nvPr/>
+        </p:nvSpPr>
+        <p:spPr>
+          <a:xfrm>
+            <a:off x="8184956" y="914400"/>
+            <a:ext cx="2743200" cy="461665"/>
+          </a:xfrm>
+          <a:prstGeom prst="rect">
+            <a:avLst/>
+          </a:prstGeom>
+          <a:noFill/>
+        </p:spPr>
+        <p:txBody>
+          <a:bodyPr wrap="square" lIns="9144" rIns="9144" rtlCol="0">
+            <a:spAutoFit/>
+          </a:bodyPr>
+          <a:lstStyle/>
+          <a:p>
+            <a:pPr algn="ctr"/>
+            <a:r>
+              <a:rPr lang="en-US" sz="2400" b="1" dirty="0"/>
+              <a:t>Bounded Rationality</a:t>
+            </a:r>
+          </a:p>
+        </p:txBody>
+      </p:sp>
+      <p:sp>
+        <p:nvSpPr>
+          <p:cNvPr id="13" name="Rectangle 12"/>
           <p:cNvSpPr/>
           <p:nvPr/>
         </p:nvSpPr>
         <p:spPr>
           <a:xfrm>
-            <a:off x="5038299" y="150119"/>
-            <a:ext cx="2115403" cy="1937982"/>
-          </a:xfrm>
-          <a:prstGeom prst="downArrowCallout">
+            <a:off x="658814" y="4572000"/>
+            <a:ext cx="3200400" cy="923330"/>
+          </a:xfrm>
+          <a:prstGeom prst="rect">
             <a:avLst/>
           </a:prstGeom>
-          <a:solidFill>
-            <a:srgbClr val="FF0000"/>
-          </a:solidFill>
-        </p:spPr>
-        <p:style>
-          <a:lnRef idx="0">
-            <a:schemeClr val="accent2"/>
-          </a:lnRef>
-          <a:fillRef idx="3">
-            <a:schemeClr val="accent2"/>
-          </a:fillRef>
-          <a:effectRef idx="3">
-            <a:schemeClr val="accent2"/>
-          </a:effectRef>
-          <a:fontRef idx="minor">
-            <a:schemeClr val="lt1"/>
-          </a:fontRef>
-        </p:style>
-        <p:txBody>
-          <a:bodyPr rtlCol="0" anchor="ctr"/>
-          <a:lstStyle/>
-          <a:p>
-            <a:pPr algn="ctr"/>
-            <a:r>
-              <a:rPr lang="en-US" b="1" dirty="0"/>
-              <a:t>Whistleblowing</a:t>
-            </a:r>
-          </a:p>
-        </p:txBody>
-      </p:sp>
-      <p:sp>
-        <p:nvSpPr>
-          <p:cNvPr id="4" name="Callout: Down Arrow 3"/>
+        </p:spPr>
+        <p:txBody>
+          <a:bodyPr wrap="square">
+            <a:spAutoFit/>
+          </a:bodyPr>
+          <a:lstStyle/>
+          <a:p>
+            <a:r>
+              <a:rPr lang="en-US" dirty="0"/>
+              <a:t>Minimizes the dehumanizing nature of various organizational paradigms.</a:t>
+            </a:r>
+          </a:p>
+        </p:txBody>
+      </p:sp>
+      <p:sp>
+        <p:nvSpPr>
+          <p:cNvPr id="14" name="Rectangle 13"/>
           <p:cNvSpPr/>
           <p:nvPr/>
         </p:nvSpPr>
         <p:spPr>
           <a:xfrm>
-            <a:off x="917585" y="150119"/>
-            <a:ext cx="2115403" cy="1937982"/>
-          </a:xfrm>
-          <a:prstGeom prst="downArrowCallout">
+            <a:off x="4724400" y="4572000"/>
+            <a:ext cx="2743200" cy="1477328"/>
+          </a:xfrm>
+          <a:prstGeom prst="rect">
             <a:avLst/>
           </a:prstGeom>
         </p:spPr>
-        <p:style>
-          <a:lnRef idx="0">
-            <a:schemeClr val="dk1"/>
-          </a:lnRef>
-          <a:fillRef idx="3">
-            <a:schemeClr val="dk1"/>
-          </a:fillRef>
-          <a:effectRef idx="3">
-            <a:schemeClr val="dk1"/>
-          </a:effectRef>
-          <a:fontRef idx="minor">
-            <a:schemeClr val="lt1"/>
-          </a:fontRef>
-        </p:style>
-        <p:txBody>
-          <a:bodyPr rtlCol="0" anchor="ctr"/>
-          <a:lstStyle/>
-          <a:p>
-            <a:pPr algn="ctr"/>
-            <a:r>
-              <a:rPr lang="en-US" b="1" dirty="0"/>
-              <a:t>Dehumanization</a:t>
-            </a:r>
-          </a:p>
-        </p:txBody>
-      </p:sp>
-      <p:sp>
-        <p:nvSpPr>
-          <p:cNvPr id="5" name="Callout: Down Arrow 4"/>
+        <p:txBody>
+          <a:bodyPr>
+            <a:spAutoFit/>
+          </a:bodyPr>
+          <a:lstStyle/>
+          <a:p>
+            <a:r>
+              <a:rPr lang="en-US" dirty="0"/>
+              <a:t>Affirms whistleblowing as a legitimate strategy for effectuating organizational change while minimizing the need for it.</a:t>
+            </a:r>
+          </a:p>
+        </p:txBody>
+      </p:sp>
+      <p:sp>
+        <p:nvSpPr>
+          <p:cNvPr id="15" name="Rectangle 14"/>
           <p:cNvSpPr/>
           <p:nvPr/>
         </p:nvSpPr>
         <p:spPr>
           <a:xfrm>
-            <a:off x="9162198" y="150119"/>
-            <a:ext cx="2115403" cy="1937982"/>
-          </a:xfrm>
-          <a:prstGeom prst="downArrowCallout">
+            <a:off x="8184956" y="4572000"/>
+            <a:ext cx="2743200" cy="646331"/>
+          </a:xfrm>
+          <a:prstGeom prst="rect">
             <a:avLst/>
           </a:prstGeom>
         </p:spPr>
-        <p:style>
-          <a:lnRef idx="0">
-            <a:schemeClr val="accent2"/>
-          </a:lnRef>
-          <a:fillRef idx="3">
-            <a:schemeClr val="accent2"/>
-          </a:fillRef>
-          <a:effectRef idx="3">
-            <a:schemeClr val="accent2"/>
-          </a:effectRef>
-          <a:fontRef idx="minor">
-            <a:schemeClr val="lt1"/>
-          </a:fontRef>
-        </p:style>
-        <p:txBody>
-          <a:bodyPr rtlCol="0" anchor="ctr"/>
-          <a:lstStyle/>
-          <a:p>
-            <a:pPr algn="ctr"/>
-            <a:r>
-              <a:rPr lang="en-US" b="1" dirty="0"/>
-              <a:t>Bounded Rationality</a:t>
-            </a:r>
-          </a:p>
-        </p:txBody>
-      </p:sp>
-      <p:sp>
-        <p:nvSpPr>
-          <p:cNvPr id="6" name="Thought Bubble: Cloud 5"/>
-          <p:cNvSpPr/>
-          <p:nvPr/>
-        </p:nvSpPr>
-        <p:spPr>
-          <a:xfrm>
-            <a:off x="4175760" y="3534767"/>
-            <a:ext cx="3840480" cy="3200400"/>
-          </a:xfrm>
-          <a:prstGeom prst="cloudCallout">
-            <a:avLst>
-              <a:gd name="adj1" fmla="val 544"/>
-              <a:gd name="adj2" fmla="val -82628"/>
-            </a:avLst>
-          </a:prstGeom>
-        </p:spPr>
-        <p:style>
-          <a:lnRef idx="2">
-            <a:schemeClr val="accent1">
-              <a:shade val="50000"/>
-            </a:schemeClr>
-          </a:lnRef>
-          <a:fillRef idx="1">
-            <a:schemeClr val="accent1"/>
-          </a:fillRef>
-          <a:effectRef idx="0">
-            <a:schemeClr val="accent1"/>
-          </a:effectRef>
-          <a:fontRef idx="minor">
-            <a:schemeClr val="lt1"/>
-          </a:fontRef>
-        </p:style>
-        <p:txBody>
-          <a:bodyPr lIns="9144" rIns="9144" rtlCol="0" anchor="ctr"/>
-          <a:lstStyle/>
-          <a:p>
-            <a:pPr algn="ctr"/>
-            <a:r>
-              <a:rPr lang="en-US" dirty="0"/>
-              <a:t>Affirms whistleblowing as a legitimate strategy for effectuating organizational change but creates an environment that minimizes the need for it.</a:t>
-            </a:r>
-          </a:p>
-        </p:txBody>
-      </p:sp>
-      <p:sp>
-        <p:nvSpPr>
-          <p:cNvPr id="7" name="Thought Bubble: Cloud 6"/>
-          <p:cNvSpPr/>
-          <p:nvPr/>
-        </p:nvSpPr>
-        <p:spPr>
-          <a:xfrm>
-            <a:off x="51861" y="3534767"/>
-            <a:ext cx="3840480" cy="3200400"/>
-          </a:xfrm>
-          <a:prstGeom prst="cloudCallout">
-            <a:avLst>
-              <a:gd name="adj1" fmla="val 544"/>
-              <a:gd name="adj2" fmla="val -82628"/>
-            </a:avLst>
-          </a:prstGeom>
-        </p:spPr>
-        <p:style>
-          <a:lnRef idx="2">
-            <a:schemeClr val="accent1">
-              <a:shade val="50000"/>
-            </a:schemeClr>
-          </a:lnRef>
-          <a:fillRef idx="1">
-            <a:schemeClr val="accent1"/>
-          </a:fillRef>
-          <a:effectRef idx="0">
-            <a:schemeClr val="accent1"/>
-          </a:effectRef>
-          <a:fontRef idx="minor">
-            <a:schemeClr val="lt1"/>
-          </a:fontRef>
-        </p:style>
-        <p:txBody>
-          <a:bodyPr rtlCol="0" anchor="ctr"/>
-          <a:lstStyle/>
-          <a:p>
-            <a:pPr algn="ctr"/>
-            <a:r>
-              <a:rPr lang="en-US" dirty="0"/>
-              <a:t>Minimizes the dehumanizing nature of organizations.</a:t>
-            </a:r>
-          </a:p>
-        </p:txBody>
-      </p:sp>
-      <p:sp>
-        <p:nvSpPr>
-          <p:cNvPr id="8" name="Thought Bubble: Cloud 7"/>
-          <p:cNvSpPr/>
-          <p:nvPr/>
-        </p:nvSpPr>
-        <p:spPr>
-          <a:xfrm>
-            <a:off x="8299659" y="3534767"/>
-            <a:ext cx="3840480" cy="3200400"/>
-          </a:xfrm>
-          <a:prstGeom prst="cloudCallout">
-            <a:avLst>
-              <a:gd name="adj1" fmla="val 189"/>
-              <a:gd name="adj2" fmla="val -82628"/>
-            </a:avLst>
-          </a:prstGeom>
-        </p:spPr>
-        <p:style>
-          <a:lnRef idx="2">
-            <a:schemeClr val="accent1">
-              <a:shade val="50000"/>
-            </a:schemeClr>
-          </a:lnRef>
-          <a:fillRef idx="1">
-            <a:schemeClr val="accent1"/>
-          </a:fillRef>
-          <a:effectRef idx="0">
-            <a:schemeClr val="accent1"/>
-          </a:effectRef>
-          <a:fontRef idx="minor">
-            <a:schemeClr val="lt1"/>
-          </a:fontRef>
-        </p:style>
-        <p:txBody>
-          <a:bodyPr rtlCol="0" anchor="ctr"/>
-          <a:lstStyle/>
-          <a:p>
-            <a:pPr algn="ctr"/>
+        <p:txBody>
+          <a:bodyPr wrap="square">
+            <a:spAutoFit/>
+          </a:bodyPr>
+          <a:lstStyle/>
+          <a:p>
             <a:r>
               <a:rPr lang="en-US" dirty="0"/>
               <a:t>Mitigates the limitations of bounded rationality.</a:t>
@@ -4111,7 +4223,7 @@
     </p:spTree>
     <p:extLst>
       <p:ext uri="{BB962C8B-B14F-4D97-AF65-F5344CB8AC3E}">
-        <p14:creationId xmlns:p14="http://schemas.microsoft.com/office/powerpoint/2010/main" val="2345814245"/>
+        <p14:creationId xmlns:p14="http://schemas.microsoft.com/office/powerpoint/2010/main" val="3259005540"/>
       </p:ext>
     </p:extLst>
   </p:cSld>
@@ -4140,269 +4252,277 @@
       </p:grpSpPr>
       <p:sp>
         <p:nvSpPr>
-          <p:cNvPr id="3" name="Callout: Down Arrow 2"/>
+          <p:cNvPr id="2" name="Rectangle 1"/>
           <p:cNvSpPr/>
           <p:nvPr/>
         </p:nvSpPr>
         <p:spPr>
           <a:xfrm>
-            <a:off x="914400" y="150119"/>
-            <a:ext cx="2115403" cy="1937982"/>
-          </a:xfrm>
-          <a:prstGeom prst="downArrowCallout">
+            <a:off x="714233" y="4572000"/>
+            <a:ext cx="3200400" cy="1754326"/>
+          </a:xfrm>
+          <a:prstGeom prst="rect">
             <a:avLst/>
           </a:prstGeom>
         </p:spPr>
-        <p:style>
-          <a:lnRef idx="0">
-            <a:schemeClr val="accent4"/>
-          </a:lnRef>
-          <a:fillRef idx="3">
-            <a:schemeClr val="accent4"/>
-          </a:fillRef>
-          <a:effectRef idx="3">
-            <a:schemeClr val="accent4"/>
-          </a:effectRef>
-          <a:fontRef idx="minor">
-            <a:schemeClr val="lt1"/>
-          </a:fontRef>
-        </p:style>
-        <p:txBody>
-          <a:bodyPr rtlCol="0" anchor="ctr"/>
-          <a:lstStyle/>
-          <a:p>
-            <a:pPr algn="ctr"/>
-            <a:r>
-              <a:rPr lang="en-US" b="1" dirty="0"/>
-              <a:t>Environmental Change</a:t>
-            </a:r>
-          </a:p>
-        </p:txBody>
-      </p:sp>
-      <p:sp>
-        <p:nvSpPr>
-          <p:cNvPr id="4" name="Callout: Down Arrow 3"/>
+        <p:txBody>
+          <a:bodyPr wrap="square">
+            <a:spAutoFit/>
+          </a:bodyPr>
+          <a:lstStyle/>
+          <a:p>
+            <a:r>
+              <a:rPr lang="en-US" dirty="0"/>
+              <a:t>Minimizes the risk of an organization being crippled or destroyed from inadequate or inappropriate responses to changes in the operating environment.</a:t>
+            </a:r>
+          </a:p>
+        </p:txBody>
+      </p:sp>
+      <p:sp>
+        <p:nvSpPr>
+          <p:cNvPr id="3" name="Rectangle 2"/>
           <p:cNvSpPr/>
           <p:nvPr/>
         </p:nvSpPr>
         <p:spPr>
           <a:xfrm>
-            <a:off x="5038299" y="150119"/>
-            <a:ext cx="2115403" cy="1937982"/>
-          </a:xfrm>
-          <a:prstGeom prst="downArrowCallout">
+            <a:off x="4808560" y="4572000"/>
+            <a:ext cx="2743200" cy="1200329"/>
+          </a:xfrm>
+          <a:prstGeom prst="rect">
             <a:avLst/>
           </a:prstGeom>
         </p:spPr>
-        <p:style>
-          <a:lnRef idx="0">
-            <a:schemeClr val="accent6"/>
-          </a:lnRef>
-          <a:fillRef idx="3">
-            <a:schemeClr val="accent6"/>
-          </a:fillRef>
-          <a:effectRef idx="3">
-            <a:schemeClr val="accent6"/>
-          </a:effectRef>
-          <a:fontRef idx="minor">
-            <a:schemeClr val="lt1"/>
-          </a:fontRef>
-        </p:style>
-        <p:txBody>
-          <a:bodyPr rtlCol="0" anchor="ctr"/>
-          <a:lstStyle/>
-          <a:p>
-            <a:pPr algn="ctr"/>
-            <a:r>
-              <a:rPr lang="en-US" b="1" dirty="0"/>
-              <a:t>The Rationality Paradox</a:t>
-            </a:r>
-          </a:p>
-        </p:txBody>
-      </p:sp>
-      <p:sp>
-        <p:nvSpPr>
-          <p:cNvPr id="5" name="Callout: Down Arrow 4"/>
+        <p:txBody>
+          <a:bodyPr wrap="square">
+            <a:spAutoFit/>
+          </a:bodyPr>
+          <a:lstStyle/>
+          <a:p>
+            <a:r>
+              <a:rPr lang="en-US" dirty="0"/>
+              <a:t>Minimizes the risk of blind abidance to rationally constructed rules leading to irrational decisions.</a:t>
+            </a:r>
+          </a:p>
+        </p:txBody>
+      </p:sp>
+      <p:sp>
+        <p:nvSpPr>
+          <p:cNvPr id="4" name="Rectangle 3"/>
           <p:cNvSpPr/>
           <p:nvPr/>
         </p:nvSpPr>
         <p:spPr>
           <a:xfrm>
-            <a:off x="9162198" y="150119"/>
-            <a:ext cx="2115403" cy="1937982"/>
-          </a:xfrm>
-          <a:prstGeom prst="downArrowCallout">
+            <a:off x="7956355" y="4567535"/>
+            <a:ext cx="3200400" cy="646331"/>
+          </a:xfrm>
+          <a:prstGeom prst="rect">
             <a:avLst/>
           </a:prstGeom>
         </p:spPr>
-        <p:style>
-          <a:lnRef idx="0">
-            <a:schemeClr val="accent3"/>
-          </a:lnRef>
-          <a:fillRef idx="3">
-            <a:schemeClr val="accent3"/>
-          </a:fillRef>
-          <a:effectRef idx="3">
-            <a:schemeClr val="accent3"/>
-          </a:effectRef>
-          <a:fontRef idx="minor">
-            <a:schemeClr val="lt1"/>
-          </a:fontRef>
-        </p:style>
-        <p:txBody>
-          <a:bodyPr rtlCol="0" anchor="ctr"/>
+        <p:txBody>
+          <a:bodyPr wrap="square">
+            <a:spAutoFit/>
+          </a:bodyPr>
+          <a:lstStyle/>
+          <a:p>
+            <a:r>
+              <a:rPr lang="en-US" dirty="0"/>
+              <a:t>Provides a new perspective for resolving ethical dilemmas.</a:t>
+            </a:r>
+          </a:p>
+        </p:txBody>
+      </p:sp>
+      <p:sp>
+        <p:nvSpPr>
+          <p:cNvPr id="5" name="TextBox 4"/>
+          <p:cNvSpPr txBox="1"/>
+          <p:nvPr/>
+        </p:nvSpPr>
+        <p:spPr>
+          <a:xfrm>
+            <a:off x="714233" y="914400"/>
+            <a:ext cx="3200400" cy="461665"/>
+          </a:xfrm>
+          <a:prstGeom prst="rect">
+            <a:avLst/>
+          </a:prstGeom>
+          <a:noFill/>
+        </p:spPr>
+        <p:txBody>
+          <a:bodyPr wrap="square" rtlCol="0">
+            <a:spAutoFit/>
+          </a:bodyPr>
           <a:lstStyle/>
           <a:p>
             <a:pPr algn="ctr"/>
             <a:r>
-              <a:rPr lang="en-US" b="1" dirty="0"/>
+              <a:rPr lang="en-US" sz="2400" b="1" dirty="0"/>
+              <a:t>Environmental Change</a:t>
+            </a:r>
+          </a:p>
+        </p:txBody>
+      </p:sp>
+      <p:sp>
+        <p:nvSpPr>
+          <p:cNvPr id="6" name="TextBox 5"/>
+          <p:cNvSpPr txBox="1"/>
+          <p:nvPr/>
+        </p:nvSpPr>
+        <p:spPr>
+          <a:xfrm>
+            <a:off x="4495800" y="914400"/>
+            <a:ext cx="3200400" cy="461665"/>
+          </a:xfrm>
+          <a:prstGeom prst="rect">
+            <a:avLst/>
+          </a:prstGeom>
+          <a:noFill/>
+        </p:spPr>
+        <p:txBody>
+          <a:bodyPr wrap="square" lIns="9144" rIns="9144" rtlCol="0">
+            <a:spAutoFit/>
+          </a:bodyPr>
+          <a:lstStyle/>
+          <a:p>
+            <a:pPr algn="ctr"/>
+            <a:r>
+              <a:rPr lang="en-US" sz="2400" b="1" dirty="0"/>
+              <a:t>Paradox of Rationality</a:t>
+            </a:r>
+          </a:p>
+        </p:txBody>
+      </p:sp>
+      <p:sp>
+        <p:nvSpPr>
+          <p:cNvPr id="7" name="TextBox 6"/>
+          <p:cNvSpPr txBox="1"/>
+          <p:nvPr/>
+        </p:nvSpPr>
+        <p:spPr>
+          <a:xfrm>
+            <a:off x="8184956" y="914400"/>
+            <a:ext cx="2743200" cy="461665"/>
+          </a:xfrm>
+          <a:prstGeom prst="rect">
+            <a:avLst/>
+          </a:prstGeom>
+          <a:noFill/>
+        </p:spPr>
+        <p:txBody>
+          <a:bodyPr wrap="square" lIns="9144" rIns="9144" rtlCol="0">
+            <a:spAutoFit/>
+          </a:bodyPr>
+          <a:lstStyle/>
+          <a:p>
+            <a:pPr algn="ctr"/>
+            <a:r>
+              <a:rPr lang="en-US" sz="2400" b="1" dirty="0"/>
               <a:t>Ethical Dilemmas</a:t>
             </a:r>
           </a:p>
         </p:txBody>
       </p:sp>
-      <p:sp>
-        <p:nvSpPr>
-          <p:cNvPr id="6" name="Thought Bubble: Cloud 5"/>
-          <p:cNvSpPr/>
+      <p:pic>
+        <p:nvPicPr>
+          <p:cNvPr id="8" name="Picture 7"/>
+          <p:cNvPicPr>
+            <a:picLocks noChangeAspect="1"/>
+          </p:cNvPicPr>
           <p:nvPr/>
-        </p:nvSpPr>
-        <p:spPr>
-          <a:xfrm>
-            <a:off x="51861" y="3534767"/>
-            <a:ext cx="3840480" cy="3200400"/>
-          </a:xfrm>
-          <a:prstGeom prst="cloudCallout">
-            <a:avLst>
-              <a:gd name="adj1" fmla="val 544"/>
-              <a:gd name="adj2" fmla="val -82628"/>
-            </a:avLst>
+        </p:nvPicPr>
+        <p:blipFill rotWithShape="1">
+          <a:blip r:embed="rId2">
+            <a:extLst>
+              <a:ext uri="{28A0092B-C50C-407E-A947-70E740481C1C}">
+                <a14:useLocalDpi xmlns:a14="http://schemas.microsoft.com/office/drawing/2010/main" val="0"/>
+              </a:ext>
+            </a:extLst>
+          </a:blip>
+          <a:srcRect l="1402" t="1066" r="1737" b="2985"/>
+          <a:stretch/>
+        </p:blipFill>
+        <p:spPr>
+          <a:xfrm>
+            <a:off x="4533018" y="1371600"/>
+            <a:ext cx="3294283" cy="3200400"/>
+          </a:xfrm>
+          <a:prstGeom prst="rect">
+            <a:avLst/>
           </a:prstGeom>
-        </p:spPr>
-        <p:style>
-          <a:lnRef idx="2">
-            <a:schemeClr val="accent1">
-              <a:shade val="50000"/>
-            </a:schemeClr>
-          </a:lnRef>
-          <a:fillRef idx="1">
-            <a:schemeClr val="accent1"/>
-          </a:fillRef>
-          <a:effectRef idx="0">
-            <a:schemeClr val="accent1"/>
-          </a:effectRef>
-          <a:fontRef idx="minor">
-            <a:schemeClr val="lt1"/>
-          </a:fontRef>
-        </p:style>
-        <p:txBody>
-          <a:bodyPr rtlCol="0" anchor="ctr"/>
-          <a:lstStyle/>
-          <a:p>
-            <a:pPr algn="ctr"/>
-            <a:r>
-              <a:rPr lang="en-US" dirty="0"/>
-              <a:t>Minimizes the risk of an organization being crippled or destroyed by changes in the operating environment.</a:t>
-            </a:r>
-          </a:p>
-        </p:txBody>
-      </p:sp>
-      <p:sp>
-        <p:nvSpPr>
-          <p:cNvPr id="7" name="Thought Bubble: Cloud 6"/>
-          <p:cNvSpPr/>
+          <a:ln>
+            <a:noFill/>
+          </a:ln>
+          <a:effectLst>
+            <a:softEdge rad="63500"/>
+          </a:effectLst>
+        </p:spPr>
+      </p:pic>
+      <p:pic>
+        <p:nvPicPr>
+          <p:cNvPr id="9" name="Picture 8"/>
+          <p:cNvPicPr>
+            <a:picLocks noChangeAspect="1"/>
+          </p:cNvPicPr>
           <p:nvPr/>
-        </p:nvSpPr>
-        <p:spPr>
-          <a:xfrm>
-            <a:off x="4172575" y="3534767"/>
-            <a:ext cx="3840480" cy="3200400"/>
-          </a:xfrm>
-          <a:prstGeom prst="cloudCallout">
-            <a:avLst>
-              <a:gd name="adj1" fmla="val 544"/>
-              <a:gd name="adj2" fmla="val -82628"/>
-            </a:avLst>
+        </p:nvPicPr>
+        <p:blipFill>
+          <a:blip r:embed="rId3"/>
+          <a:stretch>
+            <a:fillRect/>
+          </a:stretch>
+        </p:blipFill>
+        <p:spPr>
+          <a:xfrm>
+            <a:off x="8030592" y="1828800"/>
+            <a:ext cx="3051927" cy="2286000"/>
+          </a:xfrm>
+          <a:prstGeom prst="rect">
+            <a:avLst/>
           </a:prstGeom>
-        </p:spPr>
-        <p:style>
-          <a:lnRef idx="2">
-            <a:schemeClr val="accent1">
-              <a:shade val="50000"/>
-            </a:schemeClr>
-          </a:lnRef>
-          <a:fillRef idx="1">
-            <a:schemeClr val="accent1"/>
-          </a:fillRef>
-          <a:effectRef idx="0">
-            <a:schemeClr val="accent1"/>
-          </a:effectRef>
-          <a:fontRef idx="minor">
-            <a:schemeClr val="lt1"/>
-          </a:fontRef>
-        </p:style>
-        <p:txBody>
-          <a:bodyPr rtlCol="0" anchor="ctr"/>
-          <a:lstStyle/>
-          <a:p>
-            <a:pPr algn="ctr"/>
-            <a:r>
-              <a:rPr lang="en-US" dirty="0"/>
-              <a:t>Minimizes the risk of blind abidance to rationally constructed rules leading to irrational decisions.</a:t>
-            </a:r>
-          </a:p>
-        </p:txBody>
-      </p:sp>
-      <p:sp>
-        <p:nvSpPr>
-          <p:cNvPr id="8" name="Thought Bubble: Cloud 7"/>
-          <p:cNvSpPr/>
+          <a:ln>
+            <a:noFill/>
+          </a:ln>
+          <a:effectLst>
+            <a:softEdge rad="112500"/>
+          </a:effectLst>
+        </p:spPr>
+      </p:pic>
+      <p:pic>
+        <p:nvPicPr>
+          <p:cNvPr id="10" name="Picture 9"/>
+          <p:cNvPicPr>
+            <a:picLocks noChangeAspect="1"/>
+          </p:cNvPicPr>
           <p:nvPr/>
-        </p:nvSpPr>
-        <p:spPr>
-          <a:xfrm>
-            <a:off x="8299659" y="3534767"/>
-            <a:ext cx="3840480" cy="3200400"/>
-          </a:xfrm>
-          <a:prstGeom prst="cloudCallout">
-            <a:avLst>
-              <a:gd name="adj1" fmla="val 189"/>
-              <a:gd name="adj2" fmla="val -82628"/>
-            </a:avLst>
+        </p:nvPicPr>
+        <p:blipFill>
+          <a:blip r:embed="rId4"/>
+          <a:stretch>
+            <a:fillRect/>
+          </a:stretch>
+        </p:blipFill>
+        <p:spPr>
+          <a:xfrm>
+            <a:off x="552570" y="1828800"/>
+            <a:ext cx="3523726" cy="2286000"/>
+          </a:xfrm>
+          <a:prstGeom prst="rect">
+            <a:avLst/>
           </a:prstGeom>
-        </p:spPr>
-        <p:style>
-          <a:lnRef idx="2">
-            <a:schemeClr val="accent1">
-              <a:shade val="50000"/>
-            </a:schemeClr>
-          </a:lnRef>
-          <a:fillRef idx="1">
-            <a:schemeClr val="accent1"/>
-          </a:fillRef>
-          <a:effectRef idx="0">
-            <a:schemeClr val="accent1"/>
-          </a:effectRef>
-          <a:fontRef idx="minor">
-            <a:schemeClr val="lt1"/>
-          </a:fontRef>
-        </p:style>
-        <p:txBody>
-          <a:bodyPr rtlCol="0" anchor="ctr"/>
-          <a:lstStyle/>
-          <a:p>
-            <a:pPr algn="ctr"/>
-            <a:r>
-              <a:rPr lang="en-US" dirty="0"/>
-              <a:t>Provides a path for resolving ethical dilemmas.</a:t>
-            </a:r>
-          </a:p>
-        </p:txBody>
-      </p:sp>
+          <a:ln>
+            <a:noFill/>
+          </a:ln>
+          <a:effectLst>
+            <a:softEdge rad="63500"/>
+          </a:effectLst>
+        </p:spPr>
+      </p:pic>
     </p:spTree>
     <p:extLst>
       <p:ext uri="{BB962C8B-B14F-4D97-AF65-F5344CB8AC3E}">
-        <p14:creationId xmlns:p14="http://schemas.microsoft.com/office/powerpoint/2010/main" val="819402388"/>
+        <p14:creationId xmlns:p14="http://schemas.microsoft.com/office/powerpoint/2010/main" val="345189821"/>
       </p:ext>
     </p:extLst>
   </p:cSld>
@@ -4482,7 +4602,7 @@
           <a:p>
             <a:r>
               <a:rPr lang="en-US" sz="2400" dirty="0"/>
-              <a:t>Think of effectuating change not as matter of “what gives you the right” but a matter of under what circumstances do I choose to exercise my right.</a:t>
+              <a:t>Think of effectuating change not as matter of “what gives me the right” but a matter of under what circumstances do I choose to exercise my right.</a:t>
             </a:r>
           </a:p>
         </p:txBody>
@@ -4926,7 +5046,7 @@
           <a:p>
             <a:r>
               <a:rPr lang="en-US" sz="2400" dirty="0"/>
-              <a:t>Create an environment where subordinates have options to express opinions other than guerilla activity.</a:t>
+              <a:t>Create an environment where subordinates have options to express opinions and influence organization activities other than through guerilla activity.</a:t>
             </a:r>
           </a:p>
         </p:txBody>

</xml_diff>

<commit_message>
Began revised draft of reflective essay
</commit_message>
<xml_diff>
--- a/FinalPaper/Townes_POLS6320_2020_Spring_FinalPaper_Presentation_v00.pptx
+++ b/FinalPaper/Townes_POLS6320_2020_Spring_FinalPaper_Presentation_v00.pptx
@@ -249,7 +249,7 @@
           <a:p>
             <a:fld id="{721C96B5-8CD6-42CD-A2F3-B97FDED654A7}" type="datetimeFigureOut">
               <a:rPr lang="en-US" smtClean="0"/>
-              <a:t>5/1/2020</a:t>
+              <a:t>5/3/2020</a:t>
             </a:fld>
             <a:endParaRPr lang="en-US"/>
           </a:p>
@@ -417,7 +417,7 @@
           <a:p>
             <a:fld id="{721C96B5-8CD6-42CD-A2F3-B97FDED654A7}" type="datetimeFigureOut">
               <a:rPr lang="en-US" smtClean="0"/>
-              <a:t>5/1/2020</a:t>
+              <a:t>5/3/2020</a:t>
             </a:fld>
             <a:endParaRPr lang="en-US"/>
           </a:p>
@@ -595,7 +595,7 @@
           <a:p>
             <a:fld id="{721C96B5-8CD6-42CD-A2F3-B97FDED654A7}" type="datetimeFigureOut">
               <a:rPr lang="en-US" smtClean="0"/>
-              <a:t>5/1/2020</a:t>
+              <a:t>5/3/2020</a:t>
             </a:fld>
             <a:endParaRPr lang="en-US"/>
           </a:p>
@@ -763,7 +763,7 @@
           <a:p>
             <a:fld id="{721C96B5-8CD6-42CD-A2F3-B97FDED654A7}" type="datetimeFigureOut">
               <a:rPr lang="en-US" smtClean="0"/>
-              <a:t>5/1/2020</a:t>
+              <a:t>5/3/2020</a:t>
             </a:fld>
             <a:endParaRPr lang="en-US"/>
           </a:p>
@@ -1008,7 +1008,7 @@
           <a:p>
             <a:fld id="{721C96B5-8CD6-42CD-A2F3-B97FDED654A7}" type="datetimeFigureOut">
               <a:rPr lang="en-US" smtClean="0"/>
-              <a:t>5/1/2020</a:t>
+              <a:t>5/3/2020</a:t>
             </a:fld>
             <a:endParaRPr lang="en-US"/>
           </a:p>
@@ -1237,7 +1237,7 @@
           <a:p>
             <a:fld id="{721C96B5-8CD6-42CD-A2F3-B97FDED654A7}" type="datetimeFigureOut">
               <a:rPr lang="en-US" smtClean="0"/>
-              <a:t>5/1/2020</a:t>
+              <a:t>5/3/2020</a:t>
             </a:fld>
             <a:endParaRPr lang="en-US"/>
           </a:p>
@@ -1601,7 +1601,7 @@
           <a:p>
             <a:fld id="{721C96B5-8CD6-42CD-A2F3-B97FDED654A7}" type="datetimeFigureOut">
               <a:rPr lang="en-US" smtClean="0"/>
-              <a:t>5/1/2020</a:t>
+              <a:t>5/3/2020</a:t>
             </a:fld>
             <a:endParaRPr lang="en-US"/>
           </a:p>
@@ -1718,7 +1718,7 @@
           <a:p>
             <a:fld id="{721C96B5-8CD6-42CD-A2F3-B97FDED654A7}" type="datetimeFigureOut">
               <a:rPr lang="en-US" smtClean="0"/>
-              <a:t>5/1/2020</a:t>
+              <a:t>5/3/2020</a:t>
             </a:fld>
             <a:endParaRPr lang="en-US"/>
           </a:p>
@@ -1813,7 +1813,7 @@
           <a:p>
             <a:fld id="{721C96B5-8CD6-42CD-A2F3-B97FDED654A7}" type="datetimeFigureOut">
               <a:rPr lang="en-US" smtClean="0"/>
-              <a:t>5/1/2020</a:t>
+              <a:t>5/3/2020</a:t>
             </a:fld>
             <a:endParaRPr lang="en-US"/>
           </a:p>
@@ -2088,7 +2088,7 @@
           <a:p>
             <a:fld id="{721C96B5-8CD6-42CD-A2F3-B97FDED654A7}" type="datetimeFigureOut">
               <a:rPr lang="en-US" smtClean="0"/>
-              <a:t>5/1/2020</a:t>
+              <a:t>5/3/2020</a:t>
             </a:fld>
             <a:endParaRPr lang="en-US"/>
           </a:p>
@@ -2340,7 +2340,7 @@
           <a:p>
             <a:fld id="{721C96B5-8CD6-42CD-A2F3-B97FDED654A7}" type="datetimeFigureOut">
               <a:rPr lang="en-US" smtClean="0"/>
-              <a:t>5/1/2020</a:t>
+              <a:t>5/3/2020</a:t>
             </a:fld>
             <a:endParaRPr lang="en-US"/>
           </a:p>
@@ -2551,7 +2551,7 @@
           <a:p>
             <a:fld id="{721C96B5-8CD6-42CD-A2F3-B97FDED654A7}" type="datetimeFigureOut">
               <a:rPr lang="en-US" smtClean="0"/>
-              <a:t>5/1/2020</a:t>
+              <a:t>5/3/2020</a:t>
             </a:fld>
             <a:endParaRPr lang="en-US"/>
           </a:p>
@@ -3085,7 +3085,7 @@
           <p:nvPr>
             <p:extLst>
               <p:ext uri="{D42A27DB-BD31-4B8C-83A1-F6EECF244321}">
-                <p14:modId xmlns:p14="http://schemas.microsoft.com/office/powerpoint/2010/main" val="3710256244"/>
+                <p14:modId xmlns:p14="http://schemas.microsoft.com/office/powerpoint/2010/main" val="2676715799"/>
               </p:ext>
             </p:extLst>
           </p:nvPr>
@@ -3177,11 +3177,11 @@
                     <a:p>
                       <a:r>
                         <a:rPr lang="en-US" dirty="0"/>
-                        <a:t>The</a:t>
+                        <a:t>Conceptualizing</a:t>
                       </a:r>
                       <a:r>
                         <a:rPr lang="en-US" baseline="0" dirty="0"/>
-                        <a:t> nature of organizations</a:t>
+                        <a:t> the organization</a:t>
                       </a:r>
                       <a:endParaRPr lang="en-US" dirty="0"/>
                     </a:p>
@@ -3281,7 +3281,7 @@
                       </a:r>
                       <a:r>
                         <a:rPr lang="en-US" baseline="0" dirty="0"/>
-                        <a:t> conceived as a set of recursive practices, an </a:t>
+                        <a:t> conceived as a set of malleable recursive practices, an </a:t>
                       </a:r>
                       <a:r>
                         <a:rPr lang="en-US" dirty="0"/>
@@ -3309,12 +3309,8 @@
                     <a:lstStyle/>
                     <a:p>
                       <a:r>
-                        <a:rPr lang="en-US" dirty="0"/>
-                        <a:t>How</a:t>
-                      </a:r>
-                      <a:r>
                         <a:rPr lang="en-US" baseline="0" dirty="0"/>
-                        <a:t> organizational change occurs</a:t>
+                        <a:t>Effectuating organizational change</a:t>
                       </a:r>
                       <a:endParaRPr lang="en-US" dirty="0"/>
                     </a:p>
@@ -3982,36 +3978,6 @@
       </p:grpSp>
       <p:pic>
         <p:nvPicPr>
-          <p:cNvPr id="8" name="Picture 7"/>
-          <p:cNvPicPr>
-            <a:picLocks noChangeAspect="1"/>
-          </p:cNvPicPr>
-          <p:nvPr/>
-        </p:nvPicPr>
-        <p:blipFill>
-          <a:blip r:embed="rId3"/>
-          <a:stretch>
-            <a:fillRect/>
-          </a:stretch>
-        </p:blipFill>
-        <p:spPr>
-          <a:xfrm>
-            <a:off x="4362660" y="1846904"/>
-            <a:ext cx="3466680" cy="2286000"/>
-          </a:xfrm>
-          <a:prstGeom prst="rect">
-            <a:avLst/>
-          </a:prstGeom>
-          <a:ln>
-            <a:noFill/>
-          </a:ln>
-          <a:effectLst>
-            <a:softEdge rad="112500"/>
-          </a:effectLst>
-        </p:spPr>
-      </p:pic>
-      <p:pic>
-        <p:nvPicPr>
           <p:cNvPr id="9" name="Picture 8"/>
           <p:cNvPicPr>
             <a:picLocks noChangeAspect="1"/>
@@ -4019,7 +3985,7 @@
           <p:nvPr/>
         </p:nvPicPr>
         <p:blipFill>
-          <a:blip r:embed="rId4">
+          <a:blip r:embed="rId3">
             <a:extLst>
               <a:ext uri="{28A0092B-C50C-407E-A947-70E740481C1C}">
                 <a14:useLocalDpi xmlns:a14="http://schemas.microsoft.com/office/drawing/2010/main" val="0"/>
@@ -4078,13 +4044,13 @@
       </p:sp>
       <p:sp>
         <p:nvSpPr>
-          <p:cNvPr id="11" name="TextBox 10"/>
+          <p:cNvPr id="12" name="TextBox 11"/>
           <p:cNvSpPr txBox="1"/>
           <p:nvPr/>
         </p:nvSpPr>
         <p:spPr>
           <a:xfrm>
-            <a:off x="4724400" y="914400"/>
+            <a:off x="8184956" y="914400"/>
             <a:ext cx="2743200" cy="461665"/>
           </a:xfrm>
           <a:prstGeom prst="rect">
@@ -4093,7 +4059,7 @@
           <a:noFill/>
         </p:spPr>
         <p:txBody>
-          <a:bodyPr wrap="square" rtlCol="0">
+          <a:bodyPr wrap="square" lIns="9144" rIns="9144" rtlCol="0">
             <a:spAutoFit/>
           </a:bodyPr>
           <a:lstStyle/>
@@ -4101,21 +4067,105 @@
             <a:pPr algn="ctr"/>
             <a:r>
               <a:rPr lang="en-US" sz="2400" b="1" dirty="0"/>
-              <a:t>Whistleblowing</a:t>
-            </a:r>
-          </a:p>
-        </p:txBody>
-      </p:sp>
-      <p:sp>
-        <p:nvSpPr>
-          <p:cNvPr id="12" name="TextBox 11"/>
+              <a:t>Bounded Rationality</a:t>
+            </a:r>
+          </a:p>
+        </p:txBody>
+      </p:sp>
+      <p:sp>
+        <p:nvSpPr>
+          <p:cNvPr id="13" name="Rectangle 12"/>
+          <p:cNvSpPr/>
+          <p:nvPr/>
+        </p:nvSpPr>
+        <p:spPr>
+          <a:xfrm>
+            <a:off x="658814" y="4572000"/>
+            <a:ext cx="3200400" cy="923330"/>
+          </a:xfrm>
+          <a:prstGeom prst="rect">
+            <a:avLst/>
+          </a:prstGeom>
+        </p:spPr>
+        <p:txBody>
+          <a:bodyPr wrap="square">
+            <a:spAutoFit/>
+          </a:bodyPr>
+          <a:lstStyle/>
+          <a:p>
+            <a:r>
+              <a:rPr lang="en-US" dirty="0"/>
+              <a:t>Minimizes the dehumanizing nature of various organizational paradigms.</a:t>
+            </a:r>
+          </a:p>
+        </p:txBody>
+      </p:sp>
+      <p:sp>
+        <p:nvSpPr>
+          <p:cNvPr id="15" name="Rectangle 14"/>
+          <p:cNvSpPr/>
+          <p:nvPr/>
+        </p:nvSpPr>
+        <p:spPr>
+          <a:xfrm>
+            <a:off x="8184956" y="4572000"/>
+            <a:ext cx="2743200" cy="646331"/>
+          </a:xfrm>
+          <a:prstGeom prst="rect">
+            <a:avLst/>
+          </a:prstGeom>
+        </p:spPr>
+        <p:txBody>
+          <a:bodyPr wrap="square">
+            <a:spAutoFit/>
+          </a:bodyPr>
+          <a:lstStyle/>
+          <a:p>
+            <a:r>
+              <a:rPr lang="en-US" dirty="0"/>
+              <a:t>Mitigates the limitations of bounded rationality.</a:t>
+            </a:r>
+          </a:p>
+        </p:txBody>
+      </p:sp>
+      <p:sp>
+        <p:nvSpPr>
+          <p:cNvPr id="16" name="Rectangle 15"/>
+          <p:cNvSpPr/>
+          <p:nvPr/>
+        </p:nvSpPr>
+        <p:spPr>
+          <a:xfrm>
+            <a:off x="4631876" y="4576465"/>
+            <a:ext cx="2743200" cy="1200329"/>
+          </a:xfrm>
+          <a:prstGeom prst="rect">
+            <a:avLst/>
+          </a:prstGeom>
+        </p:spPr>
+        <p:txBody>
+          <a:bodyPr wrap="square">
+            <a:spAutoFit/>
+          </a:bodyPr>
+          <a:lstStyle/>
+          <a:p>
+            <a:r>
+              <a:rPr lang="en-US" dirty="0"/>
+              <a:t>Minimizes the risk of blind abidance to rationally constructed rules leading to irrational decisions.</a:t>
+            </a:r>
+          </a:p>
+        </p:txBody>
+      </p:sp>
+      <p:sp>
+        <p:nvSpPr>
+          <p:cNvPr id="17" name="TextBox 16"/>
           <p:cNvSpPr txBox="1"/>
           <p:nvPr/>
         </p:nvSpPr>
         <p:spPr>
           <a:xfrm>
-            <a:off x="8184956" y="914400"/>
-            <a:ext cx="2743200" cy="461665"/>
+            <a:off x="4319116" y="918865"/>
+            <a:ext cx="3200400" cy="461665"/>
           </a:xfrm>
           <a:prstGeom prst="rect">
             <a:avLst/>
@@ -4131,95 +4181,46 @@
             <a:pPr algn="ctr"/>
             <a:r>
               <a:rPr lang="en-US" sz="2400" b="1" dirty="0"/>
-              <a:t>Bounded Rationality</a:t>
-            </a:r>
-          </a:p>
-        </p:txBody>
-      </p:sp>
-      <p:sp>
-        <p:nvSpPr>
-          <p:cNvPr id="13" name="Rectangle 12"/>
-          <p:cNvSpPr/>
+              <a:t>Paradox of Rationality</a:t>
+            </a:r>
+          </a:p>
+        </p:txBody>
+      </p:sp>
+      <p:pic>
+        <p:nvPicPr>
+          <p:cNvPr id="18" name="Picture 17"/>
+          <p:cNvPicPr>
+            <a:picLocks noChangeAspect="1"/>
+          </p:cNvPicPr>
           <p:nvPr/>
-        </p:nvSpPr>
-        <p:spPr>
-          <a:xfrm>
-            <a:off x="658814" y="4572000"/>
-            <a:ext cx="3200400" cy="923330"/>
+        </p:nvPicPr>
+        <p:blipFill rotWithShape="1">
+          <a:blip r:embed="rId4">
+            <a:extLst>
+              <a:ext uri="{28A0092B-C50C-407E-A947-70E740481C1C}">
+                <a14:useLocalDpi xmlns:a14="http://schemas.microsoft.com/office/drawing/2010/main" val="0"/>
+              </a:ext>
+            </a:extLst>
+          </a:blip>
+          <a:srcRect l="1402" t="1066" r="1737" b="2985"/>
+          <a:stretch/>
+        </p:blipFill>
+        <p:spPr>
+          <a:xfrm>
+            <a:off x="4356334" y="1376065"/>
+            <a:ext cx="3294283" cy="3200400"/>
           </a:xfrm>
           <a:prstGeom prst="rect">
             <a:avLst/>
           </a:prstGeom>
-        </p:spPr>
-        <p:txBody>
-          <a:bodyPr wrap="square">
-            <a:spAutoFit/>
-          </a:bodyPr>
-          <a:lstStyle/>
-          <a:p>
-            <a:r>
-              <a:rPr lang="en-US" dirty="0"/>
-              <a:t>Minimizes the dehumanizing nature of various organizational paradigms.</a:t>
-            </a:r>
-          </a:p>
-        </p:txBody>
-      </p:sp>
-      <p:sp>
-        <p:nvSpPr>
-          <p:cNvPr id="14" name="Rectangle 13"/>
-          <p:cNvSpPr/>
-          <p:nvPr/>
-        </p:nvSpPr>
-        <p:spPr>
-          <a:xfrm>
-            <a:off x="4724400" y="4572000"/>
-            <a:ext cx="2743200" cy="1477328"/>
-          </a:xfrm>
-          <a:prstGeom prst="rect">
-            <a:avLst/>
-          </a:prstGeom>
-        </p:spPr>
-        <p:txBody>
-          <a:bodyPr>
-            <a:spAutoFit/>
-          </a:bodyPr>
-          <a:lstStyle/>
-          <a:p>
-            <a:r>
-              <a:rPr lang="en-US" dirty="0"/>
-              <a:t>Affirms whistleblowing as a legitimate strategy for effectuating organizational change while minimizing the need for it.</a:t>
-            </a:r>
-          </a:p>
-        </p:txBody>
-      </p:sp>
-      <p:sp>
-        <p:nvSpPr>
-          <p:cNvPr id="15" name="Rectangle 14"/>
-          <p:cNvSpPr/>
-          <p:nvPr/>
-        </p:nvSpPr>
-        <p:spPr>
-          <a:xfrm>
-            <a:off x="8184956" y="4572000"/>
-            <a:ext cx="2743200" cy="646331"/>
-          </a:xfrm>
-          <a:prstGeom prst="rect">
-            <a:avLst/>
-          </a:prstGeom>
-        </p:spPr>
-        <p:txBody>
-          <a:bodyPr wrap="square">
-            <a:spAutoFit/>
-          </a:bodyPr>
-          <a:lstStyle/>
-          <a:p>
-            <a:r>
-              <a:rPr lang="en-US" dirty="0"/>
-              <a:t>Mitigates the limitations of bounded rationality.</a:t>
-            </a:r>
-          </a:p>
-        </p:txBody>
-      </p:sp>
+          <a:ln>
+            <a:noFill/>
+          </a:ln>
+          <a:effectLst>
+            <a:softEdge rad="63500"/>
+          </a:effectLst>
+        </p:spPr>
+      </p:pic>
     </p:spTree>
     <p:extLst>
       <p:ext uri="{BB962C8B-B14F-4D97-AF65-F5344CB8AC3E}">
@@ -4280,34 +4281,6 @@
       </p:sp>
       <p:sp>
         <p:nvSpPr>
-          <p:cNvPr id="3" name="Rectangle 2"/>
-          <p:cNvSpPr/>
-          <p:nvPr/>
-        </p:nvSpPr>
-        <p:spPr>
-          <a:xfrm>
-            <a:off x="4808560" y="4572000"/>
-            <a:ext cx="2743200" cy="1200329"/>
-          </a:xfrm>
-          <a:prstGeom prst="rect">
-            <a:avLst/>
-          </a:prstGeom>
-        </p:spPr>
-        <p:txBody>
-          <a:bodyPr wrap="square">
-            <a:spAutoFit/>
-          </a:bodyPr>
-          <a:lstStyle/>
-          <a:p>
-            <a:r>
-              <a:rPr lang="en-US" dirty="0"/>
-              <a:t>Minimizes the risk of blind abidance to rationally constructed rules leading to irrational decisions.</a:t>
-            </a:r>
-          </a:p>
-        </p:txBody>
-      </p:sp>
-      <p:sp>
-        <p:nvSpPr>
           <p:cNvPr id="4" name="Rectangle 3"/>
           <p:cNvSpPr/>
           <p:nvPr/>
@@ -4366,14 +4339,14 @@
       </p:sp>
       <p:sp>
         <p:nvSpPr>
-          <p:cNvPr id="6" name="TextBox 5"/>
+          <p:cNvPr id="7" name="TextBox 6"/>
           <p:cNvSpPr txBox="1"/>
           <p:nvPr/>
         </p:nvSpPr>
         <p:spPr>
           <a:xfrm>
-            <a:off x="4495800" y="914400"/>
-            <a:ext cx="3200400" cy="461665"/>
+            <a:off x="8184956" y="914400"/>
+            <a:ext cx="2743200" cy="461665"/>
           </a:xfrm>
           <a:prstGeom prst="rect">
             <a:avLst/>
@@ -4389,36 +4362,6 @@
             <a:pPr algn="ctr"/>
             <a:r>
               <a:rPr lang="en-US" sz="2400" b="1" dirty="0"/>
-              <a:t>Paradox of Rationality</a:t>
-            </a:r>
-          </a:p>
-        </p:txBody>
-      </p:sp>
-      <p:sp>
-        <p:nvSpPr>
-          <p:cNvPr id="7" name="TextBox 6"/>
-          <p:cNvSpPr txBox="1"/>
-          <p:nvPr/>
-        </p:nvSpPr>
-        <p:spPr>
-          <a:xfrm>
-            <a:off x="8184956" y="914400"/>
-            <a:ext cx="2743200" cy="461665"/>
-          </a:xfrm>
-          <a:prstGeom prst="rect">
-            <a:avLst/>
-          </a:prstGeom>
-          <a:noFill/>
-        </p:spPr>
-        <p:txBody>
-          <a:bodyPr wrap="square" lIns="9144" rIns="9144" rtlCol="0">
-            <a:spAutoFit/>
-          </a:bodyPr>
-          <a:lstStyle/>
-          <a:p>
-            <a:pPr algn="ctr"/>
-            <a:r>
-              <a:rPr lang="en-US" sz="2400" b="1" dirty="0"/>
               <a:t>Ethical Dilemmas</a:t>
             </a:r>
           </a:p>
@@ -4426,27 +4369,22 @@
       </p:sp>
       <p:pic>
         <p:nvPicPr>
-          <p:cNvPr id="8" name="Picture 7"/>
+          <p:cNvPr id="9" name="Picture 8"/>
           <p:cNvPicPr>
             <a:picLocks noChangeAspect="1"/>
           </p:cNvPicPr>
           <p:nvPr/>
         </p:nvPicPr>
-        <p:blipFill rotWithShape="1">
-          <a:blip r:embed="rId2">
-            <a:extLst>
-              <a:ext uri="{28A0092B-C50C-407E-A947-70E740481C1C}">
-                <a14:useLocalDpi xmlns:a14="http://schemas.microsoft.com/office/drawing/2010/main" val="0"/>
-              </a:ext>
-            </a:extLst>
-          </a:blip>
-          <a:srcRect l="1402" t="1066" r="1737" b="2985"/>
-          <a:stretch/>
+        <p:blipFill>
+          <a:blip r:embed="rId2"/>
+          <a:stretch>
+            <a:fillRect/>
+          </a:stretch>
         </p:blipFill>
         <p:spPr>
           <a:xfrm>
-            <a:off x="4533018" y="1371600"/>
-            <a:ext cx="3294283" cy="3200400"/>
+            <a:off x="8030592" y="1828800"/>
+            <a:ext cx="3051927" cy="2286000"/>
           </a:xfrm>
           <a:prstGeom prst="rect">
             <a:avLst/>
@@ -4455,13 +4393,13 @@
             <a:noFill/>
           </a:ln>
           <a:effectLst>
-            <a:softEdge rad="63500"/>
+            <a:softEdge rad="112500"/>
           </a:effectLst>
         </p:spPr>
       </p:pic>
       <p:pic>
         <p:nvPicPr>
-          <p:cNvPr id="9" name="Picture 8"/>
+          <p:cNvPr id="10" name="Picture 9"/>
           <p:cNvPicPr>
             <a:picLocks noChangeAspect="1"/>
           </p:cNvPicPr>
@@ -4475,8 +4413,8 @@
         </p:blipFill>
         <p:spPr>
           <a:xfrm>
-            <a:off x="8030592" y="1828800"/>
-            <a:ext cx="3051927" cy="2286000"/>
+            <a:off x="552570" y="1828800"/>
+            <a:ext cx="3523726" cy="2286000"/>
           </a:xfrm>
           <a:prstGeom prst="rect">
             <a:avLst/>
@@ -4485,13 +4423,13 @@
             <a:noFill/>
           </a:ln>
           <a:effectLst>
-            <a:softEdge rad="112500"/>
+            <a:softEdge rad="63500"/>
           </a:effectLst>
         </p:spPr>
       </p:pic>
       <p:pic>
         <p:nvPicPr>
-          <p:cNvPr id="10" name="Picture 9"/>
+          <p:cNvPr id="11" name="Picture 10"/>
           <p:cNvPicPr>
             <a:picLocks noChangeAspect="1"/>
           </p:cNvPicPr>
@@ -4505,8 +4443,8 @@
         </p:blipFill>
         <p:spPr>
           <a:xfrm>
-            <a:off x="552570" y="1828800"/>
-            <a:ext cx="3523726" cy="2286000"/>
+            <a:off x="4362660" y="1846904"/>
+            <a:ext cx="3466680" cy="2286000"/>
           </a:xfrm>
           <a:prstGeom prst="rect">
             <a:avLst/>
@@ -4515,10 +4453,68 @@
             <a:noFill/>
           </a:ln>
           <a:effectLst>
-            <a:softEdge rad="63500"/>
+            <a:softEdge rad="112500"/>
           </a:effectLst>
         </p:spPr>
       </p:pic>
+      <p:sp>
+        <p:nvSpPr>
+          <p:cNvPr id="12" name="TextBox 11"/>
+          <p:cNvSpPr txBox="1"/>
+          <p:nvPr/>
+        </p:nvSpPr>
+        <p:spPr>
+          <a:xfrm>
+            <a:off x="4724400" y="914400"/>
+            <a:ext cx="2743200" cy="461665"/>
+          </a:xfrm>
+          <a:prstGeom prst="rect">
+            <a:avLst/>
+          </a:prstGeom>
+          <a:noFill/>
+        </p:spPr>
+        <p:txBody>
+          <a:bodyPr wrap="square" rtlCol="0">
+            <a:spAutoFit/>
+          </a:bodyPr>
+          <a:lstStyle/>
+          <a:p>
+            <a:pPr algn="ctr"/>
+            <a:r>
+              <a:rPr lang="en-US" sz="2400" b="1" dirty="0"/>
+              <a:t>Whistleblowing</a:t>
+            </a:r>
+          </a:p>
+        </p:txBody>
+      </p:sp>
+      <p:sp>
+        <p:nvSpPr>
+          <p:cNvPr id="13" name="Rectangle 12"/>
+          <p:cNvSpPr/>
+          <p:nvPr/>
+        </p:nvSpPr>
+        <p:spPr>
+          <a:xfrm>
+            <a:off x="4724400" y="4572000"/>
+            <a:ext cx="2743200" cy="1477328"/>
+          </a:xfrm>
+          <a:prstGeom prst="rect">
+            <a:avLst/>
+          </a:prstGeom>
+        </p:spPr>
+        <p:txBody>
+          <a:bodyPr>
+            <a:spAutoFit/>
+          </a:bodyPr>
+          <a:lstStyle/>
+          <a:p>
+            <a:r>
+              <a:rPr lang="en-US" dirty="0"/>
+              <a:t>Affirms whistleblowing as a legitimate strategy for effectuating organizational change while minimizing the need for it.</a:t>
+            </a:r>
+          </a:p>
+        </p:txBody>
+      </p:sp>
     </p:spTree>
     <p:extLst>
       <p:ext uri="{BB962C8B-B14F-4D97-AF65-F5344CB8AC3E}">

</xml_diff>

<commit_message>
Completed first full draft of final paper and modified presentation
</commit_message>
<xml_diff>
--- a/FinalPaper/Townes_POLS6320_2020_Spring_FinalPaper_Presentation_v00.pptx
+++ b/FinalPaper/Townes_POLS6320_2020_Spring_FinalPaper_Presentation_v00.pptx
@@ -3085,7 +3085,7 @@
           <p:nvPr>
             <p:extLst>
               <p:ext uri="{D42A27DB-BD31-4B8C-83A1-F6EECF244321}">
-                <p14:modId xmlns:p14="http://schemas.microsoft.com/office/powerpoint/2010/main" val="2676715799"/>
+                <p14:modId xmlns:p14="http://schemas.microsoft.com/office/powerpoint/2010/main" val="1945601111"/>
               </p:ext>
             </p:extLst>
           </p:nvPr>
@@ -3411,7 +3411,7 @@
                       </a:r>
                       <a:r>
                         <a:rPr lang="en-US" baseline="0" dirty="0"/>
-                        <a:t>, appropriate, and useful method to effectuate beneficial change in an organization.</a:t>
+                        <a:t>, appropriate, and useful method to effectuate beneficial change in an organizational context.</a:t>
                       </a:r>
                       <a:endParaRPr lang="en-US" dirty="0"/>
                     </a:p>
@@ -3628,7 +3628,7 @@
             <a:pPr algn="ctr"/>
             <a:r>
               <a:rPr lang="en-US" dirty="0"/>
-              <a:t>Membership in an organization does not require one to abdicate human agency.</a:t>
+              <a:t>What we conceive of as an organization cannot exist without human agency.</a:t>
             </a:r>
           </a:p>
         </p:txBody>
@@ -3714,7 +3714,7 @@
             <a:pPr algn="ctr"/>
             <a:r>
               <a:rPr lang="en-US" dirty="0"/>
-              <a:t>Every member of the organization has a right to try to effectuate organizational change regardless of status.</a:t>
+              <a:t>Every member of the organization has the right to try to effectuate organizational change regardless of status.</a:t>
             </a:r>
           </a:p>
         </p:txBody>
@@ -3778,7 +3778,22 @@
             <a:pPr algn="ctr"/>
             <a:r>
               <a:rPr lang="en-US" dirty="0"/>
-              <a:t>Every member of an organization has a warrant to influence organizational objectives and effectuate organizational change derived from their membership in the organization.</a:t>
+              <a:t>Every member of </a:t>
+            </a:r>
+            <a:br>
+              <a:rPr lang="en-US" dirty="0"/>
+            </a:br>
+            <a:r>
+              <a:rPr lang="en-US" dirty="0"/>
+              <a:t>an organization has a warrant, </a:t>
+            </a:r>
+            <a:r>
+              <a:rPr lang="en-US" dirty="0"/>
+              <a:t>rooted in human agency and their membership in the organization, </a:t>
+            </a:r>
+            <a:r>
+              <a:rPr lang="en-US" dirty="0"/>
+              <a:t>to influence organizational objectives and pursue organizational change to achieve them.</a:t>
             </a:r>
           </a:p>
         </p:txBody>
@@ -4137,7 +4152,7 @@
         <p:spPr>
           <a:xfrm>
             <a:off x="4631876" y="4576465"/>
-            <a:ext cx="2743200" cy="1200329"/>
+            <a:ext cx="2743200" cy="1477328"/>
           </a:xfrm>
           <a:prstGeom prst="rect">
             <a:avLst/>
@@ -4151,7 +4166,7 @@
           <a:p>
             <a:r>
               <a:rPr lang="en-US" dirty="0"/>
-              <a:t>Minimizes the risk of blind abidance to rationally constructed rules leading to irrational decisions.</a:t>
+              <a:t>Minimizes the risk of blind abidance to rationally constructed rules leading to irrational decisions and actions.</a:t>
             </a:r>
           </a:p>
         </p:txBody>
@@ -4569,7 +4584,7 @@
           <a:p>
             <a:r>
               <a:rPr lang="en-US" sz="3200" b="1" dirty="0"/>
-              <a:t>Implications for role as a subordinate within an organization</a:t>
+              <a:t>Application to status of subordinate within an organization</a:t>
             </a:r>
           </a:p>
         </p:txBody>
@@ -4612,7 +4627,7 @@
         <p:spPr>
           <a:xfrm>
             <a:off x="1514900" y="3182204"/>
-            <a:ext cx="10515600" cy="830997"/>
+            <a:ext cx="10515600" cy="1200329"/>
           </a:xfrm>
           <a:prstGeom prst="rect">
             <a:avLst/>
@@ -4627,7 +4642,7 @@
           <a:p>
             <a:r>
               <a:rPr lang="en-US" sz="2400" dirty="0"/>
-              <a:t>Consider organizational allegiance and commitment a matter of fulfilling ethical obligations and satisfying personal needs blind loyalty to the organizational entity.</a:t>
+              <a:t>Consider organizational allegiance and commitment a matter of fulfilling ethical obligations and satisfying personal needs rather than blind loyalty to the organizational entity.</a:t>
             </a:r>
           </a:p>
         </p:txBody>
@@ -4762,7 +4777,7 @@
           <a:p>
             <a:r>
               <a:rPr lang="en-US" sz="3200" b="1" dirty="0"/>
-              <a:t>Implications for role as a colleague to other organization members</a:t>
+              <a:t>Application to status as colleague to other organization members</a:t>
             </a:r>
           </a:p>
         </p:txBody>
@@ -4955,7 +4970,7 @@
           <a:p>
             <a:r>
               <a:rPr lang="en-US" sz="3200" b="1" dirty="0"/>
-              <a:t>Implications for role as a supervisor within an organization</a:t>
+              <a:t>Application to status as a supervisor within an organization</a:t>
             </a:r>
           </a:p>
         </p:txBody>

</xml_diff>

<commit_message>
Updated FinalPaper_v01 and presentation
</commit_message>
<xml_diff>
--- a/FinalPaper/Townes_POLS6320_2020_Spring_FinalPaper_Presentation_v00.pptx
+++ b/FinalPaper/Townes_POLS6320_2020_Spring_FinalPaper_Presentation_v00.pptx
@@ -14,6 +14,7 @@
     <p:sldId id="260" r:id="rId8"/>
     <p:sldId id="262" r:id="rId9"/>
     <p:sldId id="263" r:id="rId10"/>
+    <p:sldId id="268" r:id="rId11"/>
   </p:sldIdLst>
   <p:sldSz cx="12192000" cy="6858000"/>
   <p:notesSz cx="6858000" cy="9144000"/>
@@ -249,7 +250,7 @@
           <a:p>
             <a:fld id="{721C96B5-8CD6-42CD-A2F3-B97FDED654A7}" type="datetimeFigureOut">
               <a:rPr lang="en-US" smtClean="0"/>
-              <a:t>5/3/2020</a:t>
+              <a:t>5/4/2020</a:t>
             </a:fld>
             <a:endParaRPr lang="en-US"/>
           </a:p>
@@ -417,7 +418,7 @@
           <a:p>
             <a:fld id="{721C96B5-8CD6-42CD-A2F3-B97FDED654A7}" type="datetimeFigureOut">
               <a:rPr lang="en-US" smtClean="0"/>
-              <a:t>5/3/2020</a:t>
+              <a:t>5/4/2020</a:t>
             </a:fld>
             <a:endParaRPr lang="en-US"/>
           </a:p>
@@ -595,7 +596,7 @@
           <a:p>
             <a:fld id="{721C96B5-8CD6-42CD-A2F3-B97FDED654A7}" type="datetimeFigureOut">
               <a:rPr lang="en-US" smtClean="0"/>
-              <a:t>5/3/2020</a:t>
+              <a:t>5/4/2020</a:t>
             </a:fld>
             <a:endParaRPr lang="en-US"/>
           </a:p>
@@ -763,7 +764,7 @@
           <a:p>
             <a:fld id="{721C96B5-8CD6-42CD-A2F3-B97FDED654A7}" type="datetimeFigureOut">
               <a:rPr lang="en-US" smtClean="0"/>
-              <a:t>5/3/2020</a:t>
+              <a:t>5/4/2020</a:t>
             </a:fld>
             <a:endParaRPr lang="en-US"/>
           </a:p>
@@ -1008,7 +1009,7 @@
           <a:p>
             <a:fld id="{721C96B5-8CD6-42CD-A2F3-B97FDED654A7}" type="datetimeFigureOut">
               <a:rPr lang="en-US" smtClean="0"/>
-              <a:t>5/3/2020</a:t>
+              <a:t>5/4/2020</a:t>
             </a:fld>
             <a:endParaRPr lang="en-US"/>
           </a:p>
@@ -1237,7 +1238,7 @@
           <a:p>
             <a:fld id="{721C96B5-8CD6-42CD-A2F3-B97FDED654A7}" type="datetimeFigureOut">
               <a:rPr lang="en-US" smtClean="0"/>
-              <a:t>5/3/2020</a:t>
+              <a:t>5/4/2020</a:t>
             </a:fld>
             <a:endParaRPr lang="en-US"/>
           </a:p>
@@ -1601,7 +1602,7 @@
           <a:p>
             <a:fld id="{721C96B5-8CD6-42CD-A2F3-B97FDED654A7}" type="datetimeFigureOut">
               <a:rPr lang="en-US" smtClean="0"/>
-              <a:t>5/3/2020</a:t>
+              <a:t>5/4/2020</a:t>
             </a:fld>
             <a:endParaRPr lang="en-US"/>
           </a:p>
@@ -1718,7 +1719,7 @@
           <a:p>
             <a:fld id="{721C96B5-8CD6-42CD-A2F3-B97FDED654A7}" type="datetimeFigureOut">
               <a:rPr lang="en-US" smtClean="0"/>
-              <a:t>5/3/2020</a:t>
+              <a:t>5/4/2020</a:t>
             </a:fld>
             <a:endParaRPr lang="en-US"/>
           </a:p>
@@ -1813,7 +1814,7 @@
           <a:p>
             <a:fld id="{721C96B5-8CD6-42CD-A2F3-B97FDED654A7}" type="datetimeFigureOut">
               <a:rPr lang="en-US" smtClean="0"/>
-              <a:t>5/3/2020</a:t>
+              <a:t>5/4/2020</a:t>
             </a:fld>
             <a:endParaRPr lang="en-US"/>
           </a:p>
@@ -2088,7 +2089,7 @@
           <a:p>
             <a:fld id="{721C96B5-8CD6-42CD-A2F3-B97FDED654A7}" type="datetimeFigureOut">
               <a:rPr lang="en-US" smtClean="0"/>
-              <a:t>5/3/2020</a:t>
+              <a:t>5/4/2020</a:t>
             </a:fld>
             <a:endParaRPr lang="en-US"/>
           </a:p>
@@ -2340,7 +2341,7 @@
           <a:p>
             <a:fld id="{721C96B5-8CD6-42CD-A2F3-B97FDED654A7}" type="datetimeFigureOut">
               <a:rPr lang="en-US" smtClean="0"/>
-              <a:t>5/3/2020</a:t>
+              <a:t>5/4/2020</a:t>
             </a:fld>
             <a:endParaRPr lang="en-US"/>
           </a:p>
@@ -2551,7 +2552,7 @@
           <a:p>
             <a:fld id="{721C96B5-8CD6-42CD-A2F3-B97FDED654A7}" type="datetimeFigureOut">
               <a:rPr lang="en-US" smtClean="0"/>
-              <a:t>5/3/2020</a:t>
+              <a:t>5/4/2020</a:t>
             </a:fld>
             <a:endParaRPr lang="en-US"/>
           </a:p>
@@ -3059,6 +3060,77 @@
 </p:sld>
 </file>
 
+<file path=ppt/slides/slide10.xml><?xml version="1.0" encoding="utf-8"?>
+<p:sld xmlns:a="http://schemas.openxmlformats.org/drawingml/2006/main" xmlns:r="http://schemas.openxmlformats.org/officeDocument/2006/relationships" xmlns:p="http://schemas.openxmlformats.org/presentationml/2006/main">
+  <p:cSld>
+    <p:spTree>
+      <p:nvGrpSpPr>
+        <p:cNvPr id="1" name=""/>
+        <p:cNvGrpSpPr/>
+        <p:nvPr/>
+      </p:nvGrpSpPr>
+      <p:grpSpPr>
+        <a:xfrm>
+          <a:off x="0" y="0"/>
+          <a:ext cx="0" cy="0"/>
+          <a:chOff x="0" y="0"/>
+          <a:chExt cx="0" cy="0"/>
+        </a:xfrm>
+      </p:grpSpPr>
+      <p:sp>
+        <p:nvSpPr>
+          <p:cNvPr id="2" name="Title 1"/>
+          <p:cNvSpPr>
+            <a:spLocks noGrp="1"/>
+          </p:cNvSpPr>
+          <p:nvPr>
+            <p:ph type="title"/>
+          </p:nvPr>
+        </p:nvSpPr>
+        <p:spPr/>
+        <p:txBody>
+          <a:bodyPr/>
+          <a:lstStyle/>
+          <a:p>
+            <a:r>
+              <a:rPr lang="en-US" dirty="0"/>
+              <a:t>Questions and Discussion</a:t>
+            </a:r>
+          </a:p>
+        </p:txBody>
+      </p:sp>
+      <p:sp>
+        <p:nvSpPr>
+          <p:cNvPr id="3" name="Text Placeholder 2"/>
+          <p:cNvSpPr>
+            <a:spLocks noGrp="1"/>
+          </p:cNvSpPr>
+          <p:nvPr>
+            <p:ph type="body" idx="1"/>
+          </p:nvPr>
+        </p:nvSpPr>
+        <p:spPr/>
+        <p:txBody>
+          <a:bodyPr/>
+          <a:lstStyle/>
+          <a:p>
+            <a:endParaRPr lang="en-US" dirty="0"/>
+          </a:p>
+        </p:txBody>
+      </p:sp>
+    </p:spTree>
+    <p:extLst>
+      <p:ext uri="{BB962C8B-B14F-4D97-AF65-F5344CB8AC3E}">
+        <p14:creationId xmlns:p14="http://schemas.microsoft.com/office/powerpoint/2010/main" val="245527243"/>
+      </p:ext>
+    </p:extLst>
+  </p:cSld>
+  <p:clrMapOvr>
+    <a:masterClrMapping/>
+  </p:clrMapOvr>
+</p:sld>
+</file>
+
 <file path=ppt/slides/slide2.xml><?xml version="1.0" encoding="utf-8"?>
 <p:sld xmlns:a="http://schemas.openxmlformats.org/drawingml/2006/main" xmlns:r="http://schemas.openxmlformats.org/officeDocument/2006/relationships" xmlns:p="http://schemas.openxmlformats.org/presentationml/2006/main">
   <p:cSld>
@@ -3085,14 +3157,14 @@
           <p:nvPr>
             <p:extLst>
               <p:ext uri="{D42A27DB-BD31-4B8C-83A1-F6EECF244321}">
-                <p14:modId xmlns:p14="http://schemas.microsoft.com/office/powerpoint/2010/main" val="1945601111"/>
+                <p14:modId xmlns:p14="http://schemas.microsoft.com/office/powerpoint/2010/main" val="3476687583"/>
               </p:ext>
             </p:extLst>
           </p:nvPr>
         </p:nvGraphicFramePr>
         <p:xfrm>
-          <a:off x="152400" y="228600"/>
-          <a:ext cx="11887200" cy="6400800"/>
+          <a:off x="152400" y="320040"/>
+          <a:ext cx="11887200" cy="6217920"/>
         </p:xfrm>
         <a:graphic>
           <a:graphicData uri="http://schemas.openxmlformats.org/drawingml/2006/table">
@@ -3133,7 +3205,7 @@
                       <a:endParaRPr lang="en-US" dirty="0"/>
                     </a:p>
                   </a:txBody>
-                  <a:tcPr marT="228600" marB="228600"/>
+                  <a:tcPr marT="182880" marB="182880"/>
                 </a:tc>
                 <a:tc>
                   <a:txBody>
@@ -3147,7 +3219,7 @@
                       </a:r>
                     </a:p>
                   </a:txBody>
-                  <a:tcPr marT="228600" marB="228600"/>
+                  <a:tcPr marT="182880" marB="182880"/>
                 </a:tc>
                 <a:tc>
                   <a:txBody>
@@ -3161,7 +3233,7 @@
                       </a:r>
                     </a:p>
                   </a:txBody>
-                  <a:tcPr marT="228600" marB="228600"/>
+                  <a:tcPr marT="182880" marB="182880"/>
                 </a:tc>
                 <a:extLst>
                   <a:ext uri="{0D108BD9-81ED-4DB2-BD59-A6C34878D82A}">
@@ -3186,7 +3258,7 @@
                       <a:endParaRPr lang="en-US" dirty="0"/>
                     </a:p>
                   </a:txBody>
-                  <a:tcPr marT="228600" marB="228600"/>
+                  <a:tcPr marT="182880" marB="182880"/>
                 </a:tc>
                 <a:tc>
                   <a:txBody>
@@ -3202,12 +3274,12 @@
                       </a:br>
                       <a:r>
                         <a:rPr lang="en-US" baseline="0" dirty="0"/>
-                        <a:t>human-like entities capable of independent motivations and action.</a:t>
+                        <a:t>life-like entities capable of independent motivations and action.</a:t>
                       </a:r>
                       <a:endParaRPr lang="en-US" dirty="0"/>
                     </a:p>
                   </a:txBody>
-                  <a:tcPr marT="228600" marB="228600"/>
+                  <a:tcPr marT="182880" marB="182880"/>
                 </a:tc>
                 <a:tc>
                   <a:txBody>
@@ -3225,7 +3297,7 @@
                       <a:endParaRPr lang="en-US" dirty="0"/>
                     </a:p>
                   </a:txBody>
-                  <a:tcPr marT="228600" marB="228600"/>
+                  <a:tcPr marT="182880" marB="182880"/>
                 </a:tc>
                 <a:extLst>
                   <a:ext uri="{0D108BD9-81ED-4DB2-BD59-A6C34878D82A}">
@@ -3250,7 +3322,7 @@
                       <a:endParaRPr lang="en-US" dirty="0"/>
                     </a:p>
                   </a:txBody>
-                  <a:tcPr marT="228600" marB="228600"/>
+                  <a:tcPr marT="182880" marB="182880"/>
                 </a:tc>
                 <a:tc>
                   <a:txBody>
@@ -3268,7 +3340,7 @@
                       <a:endParaRPr lang="en-US" dirty="0"/>
                     </a:p>
                   </a:txBody>
-                  <a:tcPr marT="228600" marB="228600"/>
+                  <a:tcPr marT="182880" marB="182880"/>
                 </a:tc>
                 <a:tc>
                   <a:txBody>
@@ -3294,7 +3366,7 @@
                       <a:endParaRPr lang="en-US" dirty="0"/>
                     </a:p>
                   </a:txBody>
-                  <a:tcPr marT="228600" marB="228600"/>
+                  <a:tcPr marT="182880" marB="182880"/>
                 </a:tc>
                 <a:extLst>
                   <a:ext uri="{0D108BD9-81ED-4DB2-BD59-A6C34878D82A}">
@@ -3315,7 +3387,7 @@
                       <a:endParaRPr lang="en-US" dirty="0"/>
                     </a:p>
                   </a:txBody>
-                  <a:tcPr marT="228600" marB="228600"/>
+                  <a:tcPr marT="182880" marB="182880"/>
                 </a:tc>
                 <a:tc>
                   <a:txBody>
@@ -3324,11 +3396,19 @@
                     <a:p>
                       <a:r>
                         <a:rPr lang="en-US" dirty="0"/>
-                        <a:t>Only high level fiduciary leaders have the responsibility and authority to effectuate organizational change.</a:t>
+                        <a:t>Only high level elected and appointed</a:t>
+                      </a:r>
+                      <a:r>
+                        <a:rPr lang="en-US" baseline="0" dirty="0"/>
+                        <a:t> </a:t>
+                      </a:r>
+                      <a:r>
+                        <a:rPr lang="en-US" dirty="0"/>
+                        <a:t>fiduciary leaders have the responsibility and authority to effectuate organizational change.</a:t>
                       </a:r>
                     </a:p>
                   </a:txBody>
-                  <a:tcPr marT="228600" marB="228600"/>
+                  <a:tcPr marT="182880" marB="182880"/>
                 </a:tc>
                 <a:tc>
                   <a:txBody>
@@ -3337,7 +3417,7 @@
                     <a:p>
                       <a:r>
                         <a:rPr lang="en-US" dirty="0"/>
-                        <a:t>Every member of the organization has a right to try to</a:t>
+                        <a:t>Every member of the organization has the right, but not the obligation, to try to</a:t>
                       </a:r>
                       <a:r>
                         <a:rPr lang="en-US" baseline="0" dirty="0"/>
@@ -3357,7 +3437,7 @@
                       </a:r>
                     </a:p>
                   </a:txBody>
-                  <a:tcPr marT="228600" marB="228600"/>
+                  <a:tcPr marT="182880" marB="182880"/>
                 </a:tc>
                 <a:extLst>
                   <a:ext uri="{0D108BD9-81ED-4DB2-BD59-A6C34878D82A}">
@@ -3377,7 +3457,7 @@
                       </a:r>
                     </a:p>
                   </a:txBody>
-                  <a:tcPr marT="228600" marB="228600"/>
+                  <a:tcPr marT="182880" marB="182880"/>
                 </a:tc>
                 <a:tc>
                   <a:txBody>
@@ -3398,7 +3478,7 @@
                       </a:r>
                     </a:p>
                   </a:txBody>
-                  <a:tcPr marT="228600" marB="228600"/>
+                  <a:tcPr marT="182880" marB="182880"/>
                 </a:tc>
                 <a:tc>
                   <a:txBody>
@@ -3416,7 +3496,7 @@
                       <a:endParaRPr lang="en-US" dirty="0"/>
                     </a:p>
                   </a:txBody>
-                  <a:tcPr marT="228600" marB="228600"/>
+                  <a:tcPr marT="182880" marB="182880"/>
                 </a:tc>
                 <a:extLst>
                   <a:ext uri="{0D108BD9-81ED-4DB2-BD59-A6C34878D82A}">
@@ -3482,7 +3562,7 @@
           <a:p>
             <a:r>
               <a:rPr lang="en-US" sz="3200" dirty="0"/>
-              <a:t>Setting organizational objectives and effectuating organizational change to achieve those objectives are not the exclusive responsibility, right, and privilege of the organization’s fiduciary leaders. </a:t>
+              <a:t>Setting organizational objectives and effectuating organizational change to achieve those objectives are not the exclusive right and privilege of the organization’s elected or appointed fiduciary leaders. </a:t>
             </a:r>
           </a:p>
         </p:txBody>
@@ -3785,15 +3865,7 @@
             </a:br>
             <a:r>
               <a:rPr lang="en-US" dirty="0"/>
-              <a:t>an organization has a warrant, </a:t>
-            </a:r>
-            <a:r>
-              <a:rPr lang="en-US" dirty="0"/>
-              <a:t>rooted in human agency and their membership in the organization, </a:t>
-            </a:r>
-            <a:r>
-              <a:rPr lang="en-US" dirty="0"/>
-              <a:t>to influence organizational objectives and pursue organizational change to achieve them.</a:t>
+              <a:t>an organization has a warrant, rooted in human agency and their membership in the organization, to influence organizational objectives and pursue organizational change to achieve them.</a:t>
             </a:r>
           </a:p>
         </p:txBody>
@@ -3860,18 +3932,16 @@
       </p:grpSpPr>
       <p:grpSp>
         <p:nvGrpSpPr>
-          <p:cNvPr id="6" name="Group 5"/>
-          <p:cNvGrpSpPr>
-            <a:grpSpLocks noChangeAspect="1"/>
-          </p:cNvGrpSpPr>
+          <p:cNvPr id="11" name="Group 10"/>
+          <p:cNvGrpSpPr/>
           <p:nvPr/>
         </p:nvGrpSpPr>
         <p:grpSpPr>
           <a:xfrm>
-            <a:off x="734407" y="2075504"/>
-            <a:ext cx="3049215" cy="1828800"/>
-            <a:chOff x="6029740" y="3314038"/>
-            <a:chExt cx="2769703" cy="1661160"/>
+            <a:off x="734407" y="1995605"/>
+            <a:ext cx="3049215" cy="1961320"/>
+            <a:chOff x="734407" y="2049000"/>
+            <a:chExt cx="3049215" cy="1961320"/>
           </a:xfrm>
         </p:grpSpPr>
         <p:pic>
@@ -3895,8 +3965,8 @@
           </p:blipFill>
           <p:spPr>
             <a:xfrm>
-              <a:off x="8077200" y="3314038"/>
-              <a:ext cx="722243" cy="1661160"/>
+              <a:off x="2988492" y="2181520"/>
+              <a:ext cx="795130" cy="1828800"/>
             </a:xfrm>
             <a:prstGeom prst="rect">
               <a:avLst/>
@@ -3924,8 +3994,8 @@
           </p:blipFill>
           <p:spPr>
             <a:xfrm>
-              <a:off x="7414591" y="3314038"/>
-              <a:ext cx="662609" cy="1661160"/>
+              <a:off x="2259014" y="2115260"/>
+              <a:ext cx="729478" cy="1828800"/>
             </a:xfrm>
             <a:prstGeom prst="rect">
               <a:avLst/>
@@ -3953,8 +4023,8 @@
           </p:blipFill>
           <p:spPr>
             <a:xfrm>
-              <a:off x="6765235" y="3314038"/>
-              <a:ext cx="636104" cy="1661160"/>
+              <a:off x="1544126" y="2075504"/>
+              <a:ext cx="700298" cy="1828800"/>
             </a:xfrm>
             <a:prstGeom prst="rect">
               <a:avLst/>
@@ -3982,8 +4052,8 @@
           </p:blipFill>
           <p:spPr>
             <a:xfrm>
-              <a:off x="6029740" y="3314038"/>
-              <a:ext cx="735495" cy="1661160"/>
+              <a:off x="734407" y="2049000"/>
+              <a:ext cx="809719" cy="1828800"/>
             </a:xfrm>
             <a:prstGeom prst="rect">
               <a:avLst/>
@@ -4013,7 +4083,7 @@
         </p:blipFill>
         <p:spPr>
           <a:xfrm>
-            <a:off x="8121334" y="1846904"/>
+            <a:off x="8121334" y="1833265"/>
             <a:ext cx="2870444" cy="2286000"/>
           </a:xfrm>
           <a:prstGeom prst="rect">
@@ -4642,7 +4712,7 @@
           <a:p>
             <a:r>
               <a:rPr lang="en-US" sz="2400" dirty="0"/>
-              <a:t>Consider organizational allegiance and commitment a matter of fulfilling ethical obligations and satisfying personal needs rather than blind loyalty to the organizational entity.</a:t>
+              <a:t>Consider organizational allegiance and commitment a matter of fulfilling ethical obligations to other living beings and satisfying personal needs rather than blind loyalty to the organizational entity.</a:t>
             </a:r>
           </a:p>
         </p:txBody>

</xml_diff>